<commit_message>
Add test graph D4
</commit_message>
<xml_diff>
--- a/de.tudarmstadt.maki.modeling.jvlc/instances/testgraphs.pptx
+++ b/de.tudarmstadt.maki.modeling.jvlc/instances/testgraphs.pptx
@@ -6299,6 +6299,12 @@
           <a:lstStyle/>
           <a:p>
             <a:r>
+              <a:rPr lang="en-US" smtClean="0"/>
+              <a:t>n=11, m=19*2=38</a:t>
+            </a:r>
+          </a:p>
+          <a:p>
+            <a:r>
               <a:rPr lang="en-US" dirty="0" smtClean="0"/>
               <a:t>A larger graph with context events</a:t>
             </a:r>

</xml_diff>

<commit_message>
Write test for first TC iteration of D4
</commit_message>
<xml_diff>
--- a/de.tudarmstadt.maki.modeling.jvlc/instances/testgraphs.pptx
+++ b/de.tudarmstadt.maki.modeling.jvlc/instances/testgraphs.pptx
@@ -6299,7 +6299,7 @@
           <a:lstStyle/>
           <a:p>
             <a:r>
-              <a:rPr lang="en-US" smtClean="0"/>
+              <a:rPr lang="en-US" dirty="0" smtClean="0"/>
               <a:t>n=11, m=19*2=38</a:t>
             </a:r>
           </a:p>
@@ -6312,7 +6312,11 @@
           <a:p>
             <a:r>
               <a:rPr lang="en-US" dirty="0" smtClean="0"/>
-              <a:t>Inactive links after first TC iteration (k=2.0): e1-3,e2-3,e2-4,e2-5,e3-11,e9-11</a:t>
+              <a:t>Inactive links after first TC iteration (k=2.0</a:t>
+            </a:r>
+            <a:r>
+              <a:rPr lang="en-US" smtClean="0"/>
+              <a:t>): e1-3,e2-3,e2-4,e2-5,e3-9,e3-11,e9-11</a:t>
             </a:r>
             <a:endParaRPr lang="en-US" dirty="0"/>
           </a:p>
@@ -6851,6 +6855,7 @@
               <a:solidFill>
                 <a:schemeClr val="tx1"/>
               </a:solidFill>
+              <a:prstDash val="sysDot"/>
             </a:ln>
           </p:spPr>
           <p:style>

</xml_diff>

<commit_message>
Fix specification: NAC flag check in for loop makes no sense.
</commit_message>
<xml_diff>
--- a/de.tudarmstadt.maki.modeling.jvlc/instances/testgraphs.pptx
+++ b/de.tudarmstadt.maki.modeling.jvlc/instances/testgraphs.pptx
@@ -6312,11 +6312,7 @@
           <a:p>
             <a:r>
               <a:rPr lang="en-US" dirty="0" smtClean="0"/>
-              <a:t>Inactive links after first TC iteration (k=2.0</a:t>
-            </a:r>
-            <a:r>
-              <a:rPr lang="en-US" smtClean="0"/>
-              <a:t>): e1-3,e2-3,e2-4,e2-5,e3-9,e3-11,e9-11</a:t>
+              <a:t>Inactive links after first TC iteration (k=2.0): e1-3,e2-3,e2-4,e2-5,e3-9,e3-11,e9-11</a:t>
             </a:r>
             <a:endParaRPr lang="en-US" dirty="0"/>
           </a:p>
@@ -8344,6 +8340,17 @@
               <a:rPr lang="en-US" dirty="0" smtClean="0"/>
               <a:t>Add link e7-9 with distance 10, remove node 10 </a:t>
             </a:r>
+          </a:p>
+          <a:p>
+            <a:r>
+              <a:rPr lang="en-US" dirty="0" smtClean="0"/>
+              <a:t>n = 10, m = </a:t>
+            </a:r>
+            <a:r>
+              <a:rPr lang="en-US" smtClean="0"/>
+              <a:t>(19-3+1)*2=34</a:t>
+            </a:r>
+            <a:endParaRPr lang="en-US" dirty="0" smtClean="0"/>
           </a:p>
           <a:p>
             <a:r>

</xml_diff>

<commit_message>
Successful complex unit test D4
</commit_message>
<xml_diff>
--- a/de.tudarmstadt.maki.modeling.jvlc/instances/testgraphs.pptx
+++ b/de.tudarmstadt.maki.modeling.jvlc/instances/testgraphs.pptx
@@ -8344,13 +8344,8 @@
           <a:p>
             <a:r>
               <a:rPr lang="en-US" dirty="0" smtClean="0"/>
-              <a:t>n = 10, m = </a:t>
-            </a:r>
-            <a:r>
-              <a:rPr lang="en-US" smtClean="0"/>
-              <a:t>(19-3+1)*2=34</a:t>
-            </a:r>
-            <a:endParaRPr lang="en-US" dirty="0" smtClean="0"/>
+              <a:t>n = 10, m = (19-3+1)*2=34</a:t>
+            </a:r>
           </a:p>
           <a:p>
             <a:r>
@@ -12028,7 +12023,7 @@
         <p:spPr>
           <a:xfrm>
             <a:off x="838200" y="1825625"/>
-            <a:ext cx="4157085" cy="4351338"/>
+            <a:ext cx="3674513" cy="4351338"/>
           </a:xfrm>
         </p:spPr>
         <p:txBody>
@@ -12050,7 +12045,22 @@
             </a:br>
             <a:r>
               <a:rPr lang="en-US" dirty="0" smtClean="0"/>
-              <a:t>d(e2-6) = 15, d(e2-5) = 15</a:t>
+              <a:t>d(e2-6) = 15</a:t>
+            </a:r>
+            <a:r>
+              <a:rPr lang="en-US" smtClean="0"/>
+              <a:t>, </a:t>
+            </a:r>
+            <a:br>
+              <a:rPr lang="en-US" smtClean="0"/>
+            </a:br>
+            <a:r>
+              <a:rPr lang="en-US" smtClean="0"/>
+              <a:t>d(e2-5</a:t>
+            </a:r>
+            <a:r>
+              <a:rPr lang="en-US" dirty="0" smtClean="0"/>
+              <a:t>) = 15</a:t>
             </a:r>
           </a:p>
           <a:p>
@@ -13889,6 +13899,10 @@
           <a:bodyPr/>
           <a:lstStyle/>
           <a:p>
+            <a:r>
+              <a:rPr lang="en-US" dirty="0" smtClean="0"/>
+              <a:t>New </a:t>
+            </a:r>
             <a:endParaRPr lang="en-US" dirty="0"/>
           </a:p>
         </p:txBody>

</xml_diff>

<commit_message>
Add unit test for ID constraint of e-kTC
</commit_message>
<xml_diff>
--- a/de.tudarmstadt.maki.modeling.jvlc/instances/testgraphs.pptx
+++ b/de.tudarmstadt.maki.modeling.jvlc/instances/testgraphs.pptx
@@ -16,6 +16,7 @@
     <p:sldId id="265" r:id="rId10"/>
     <p:sldId id="259" r:id="rId11"/>
     <p:sldId id="260" r:id="rId12"/>
+    <p:sldId id="267" r:id="rId13"/>
   </p:sldIdLst>
   <p:sldSz cx="12192000" cy="6858000"/>
   <p:notesSz cx="6858000" cy="9144000"/>
@@ -134,6 +135,7 @@
           <p14:sldIdLst>
             <p14:sldId id="259"/>
             <p14:sldId id="260"/>
+            <p14:sldId id="267"/>
           </p14:sldIdLst>
         </p14:section>
       </p14:sectionLst>
@@ -287,7 +289,7 @@
           <a:p>
             <a:fld id="{AA2F2A37-85DD-45B9-AC18-C6701B3AEA4C}" type="datetimeFigureOut">
               <a:rPr lang="en-US" smtClean="0"/>
-              <a:t>10/18/2015</a:t>
+              <a:t>11/10/2015</a:t>
             </a:fld>
             <a:endParaRPr lang="en-US"/>
           </a:p>
@@ -540,7 +542,7 @@
           <a:p>
             <a:fld id="{AA2F2A37-85DD-45B9-AC18-C6701B3AEA4C}" type="datetimeFigureOut">
               <a:rPr lang="en-US" smtClean="0"/>
-              <a:t>10/18/2015</a:t>
+              <a:t>11/10/2015</a:t>
             </a:fld>
             <a:endParaRPr lang="en-US"/>
           </a:p>
@@ -710,7 +712,7 @@
           <a:p>
             <a:fld id="{AA2F2A37-85DD-45B9-AC18-C6701B3AEA4C}" type="datetimeFigureOut">
               <a:rPr lang="en-US" smtClean="0"/>
-              <a:t>10/18/2015</a:t>
+              <a:t>11/10/2015</a:t>
             </a:fld>
             <a:endParaRPr lang="en-US"/>
           </a:p>
@@ -890,7 +892,7 @@
           <a:p>
             <a:fld id="{AA2F2A37-85DD-45B9-AC18-C6701B3AEA4C}" type="datetimeFigureOut">
               <a:rPr lang="en-US" smtClean="0"/>
-              <a:t>10/18/2015</a:t>
+              <a:t>11/10/2015</a:t>
             </a:fld>
             <a:endParaRPr lang="en-US"/>
           </a:p>
@@ -1060,7 +1062,7 @@
           <a:p>
             <a:fld id="{AA2F2A37-85DD-45B9-AC18-C6701B3AEA4C}" type="datetimeFigureOut">
               <a:rPr lang="en-US" smtClean="0"/>
-              <a:t>10/18/2015</a:t>
+              <a:t>11/10/2015</a:t>
             </a:fld>
             <a:endParaRPr lang="en-US"/>
           </a:p>
@@ -1249,7 +1251,7 @@
           <a:p>
             <a:fld id="{AA2F2A37-85DD-45B9-AC18-C6701B3AEA4C}" type="datetimeFigureOut">
               <a:rPr lang="en-US" smtClean="0"/>
-              <a:t>10/18/2015</a:t>
+              <a:t>11/10/2015</a:t>
             </a:fld>
             <a:endParaRPr lang="en-US"/>
           </a:p>
@@ -1502,7 +1504,7 @@
           <a:p>
             <a:fld id="{AA2F2A37-85DD-45B9-AC18-C6701B3AEA4C}" type="datetimeFigureOut">
               <a:rPr lang="en-US" smtClean="0"/>
-              <a:t>10/18/2015</a:t>
+              <a:t>11/10/2015</a:t>
             </a:fld>
             <a:endParaRPr lang="en-US"/>
           </a:p>
@@ -1734,7 +1736,7 @@
           <a:p>
             <a:fld id="{AA2F2A37-85DD-45B9-AC18-C6701B3AEA4C}" type="datetimeFigureOut">
               <a:rPr lang="en-US" smtClean="0"/>
-              <a:t>10/18/2015</a:t>
+              <a:t>11/10/2015</a:t>
             </a:fld>
             <a:endParaRPr lang="en-US"/>
           </a:p>
@@ -2101,7 +2103,7 @@
           <a:p>
             <a:fld id="{AA2F2A37-85DD-45B9-AC18-C6701B3AEA4C}" type="datetimeFigureOut">
               <a:rPr lang="en-US" smtClean="0"/>
-              <a:t>10/18/2015</a:t>
+              <a:t>11/10/2015</a:t>
             </a:fld>
             <a:endParaRPr lang="en-US"/>
           </a:p>
@@ -2219,7 +2221,7 @@
           <a:p>
             <a:fld id="{AA2F2A37-85DD-45B9-AC18-C6701B3AEA4C}" type="datetimeFigureOut">
               <a:rPr lang="en-US" smtClean="0"/>
-              <a:t>10/18/2015</a:t>
+              <a:t>11/10/2015</a:t>
             </a:fld>
             <a:endParaRPr lang="en-US"/>
           </a:p>
@@ -2321,7 +2323,7 @@
           <a:p>
             <a:fld id="{AA2F2A37-85DD-45B9-AC18-C6701B3AEA4C}" type="datetimeFigureOut">
               <a:rPr lang="en-US" smtClean="0"/>
-              <a:t>10/18/2015</a:t>
+              <a:t>11/10/2015</a:t>
             </a:fld>
             <a:endParaRPr lang="en-US"/>
           </a:p>
@@ -2598,7 +2600,7 @@
           <a:p>
             <a:fld id="{AA2F2A37-85DD-45B9-AC18-C6701B3AEA4C}" type="datetimeFigureOut">
               <a:rPr lang="en-US" smtClean="0"/>
-              <a:t>10/18/2015</a:t>
+              <a:t>11/10/2015</a:t>
             </a:fld>
             <a:endParaRPr lang="en-US"/>
           </a:p>
@@ -2811,7 +2813,7 @@
           <a:p>
             <a:fld id="{AA2F2A37-85DD-45B9-AC18-C6701B3AEA4C}" type="datetimeFigureOut">
               <a:rPr lang="en-US" smtClean="0"/>
-              <a:t>10/18/2015</a:t>
+              <a:t>11/10/2015</a:t>
             </a:fld>
             <a:endParaRPr lang="en-US"/>
           </a:p>
@@ -4046,8 +4048,12 @@
           <a:lstStyle/>
           <a:p>
             <a:r>
-              <a:rPr lang="en-US" smtClean="0"/>
-              <a:t>Testgraph E1</a:t>
+              <a:rPr lang="en-US" dirty="0" err="1" smtClean="0"/>
+              <a:t>Testgraph</a:t>
+            </a:r>
+            <a:r>
+              <a:rPr lang="en-US" dirty="0" smtClean="0"/>
+              <a:t> E1</a:t>
             </a:r>
             <a:endParaRPr lang="en-US" dirty="0"/>
           </a:p>
@@ -6061,6 +6067,677 @@
 </p:sld>
 </file>
 
+<file path=ppt/slides/slide12.xml><?xml version="1.0" encoding="utf-8"?>
+<p:sld xmlns:a="http://schemas.openxmlformats.org/drawingml/2006/main" xmlns:r="http://schemas.openxmlformats.org/officeDocument/2006/relationships" xmlns:p="http://schemas.openxmlformats.org/presentationml/2006/main">
+  <p:cSld>
+    <p:spTree>
+      <p:nvGrpSpPr>
+        <p:cNvPr id="1" name=""/>
+        <p:cNvGrpSpPr/>
+        <p:nvPr/>
+      </p:nvGrpSpPr>
+      <p:grpSpPr>
+        <a:xfrm>
+          <a:off x="0" y="0"/>
+          <a:ext cx="0" cy="0"/>
+          <a:chOff x="0" y="0"/>
+          <a:chExt cx="0" cy="0"/>
+        </a:xfrm>
+      </p:grpSpPr>
+      <p:sp>
+        <p:nvSpPr>
+          <p:cNvPr id="2" name="Titel 1"/>
+          <p:cNvSpPr>
+            <a:spLocks noGrp="1"/>
+          </p:cNvSpPr>
+          <p:nvPr>
+            <p:ph type="title"/>
+          </p:nvPr>
+        </p:nvSpPr>
+        <p:spPr/>
+        <p:txBody>
+          <a:bodyPr/>
+          <a:lstStyle/>
+          <a:p>
+            <a:r>
+              <a:rPr lang="en-US" dirty="0" err="1"/>
+              <a:t>Testgraph</a:t>
+            </a:r>
+            <a:r>
+              <a:rPr lang="en-US" dirty="0"/>
+              <a:t> </a:t>
+            </a:r>
+            <a:r>
+              <a:rPr lang="en-US" dirty="0" smtClean="0"/>
+              <a:t>E2</a:t>
+            </a:r>
+            <a:endParaRPr lang="en-US" dirty="0"/>
+          </a:p>
+        </p:txBody>
+      </p:sp>
+      <p:sp>
+        <p:nvSpPr>
+          <p:cNvPr id="3" name="Inhaltsplatzhalter 2"/>
+          <p:cNvSpPr>
+            <a:spLocks noGrp="1"/>
+          </p:cNvSpPr>
+          <p:nvPr>
+            <p:ph idx="1"/>
+          </p:nvPr>
+        </p:nvSpPr>
+        <p:spPr/>
+        <p:txBody>
+          <a:bodyPr/>
+          <a:lstStyle/>
+          <a:p>
+            <a:r>
+              <a:rPr lang="en-US" smtClean="0"/>
+              <a:t>k=1.1</a:t>
+            </a:r>
+          </a:p>
+          <a:p>
+            <a:r>
+              <a:rPr lang="en-US" dirty="0" smtClean="0"/>
+              <a:t>This test case illustrates a situation where two links in a triangle have the same estimated remaining lifetime (e12 and e13)</a:t>
+            </a:r>
+            <a:endParaRPr lang="en-US" dirty="0"/>
+          </a:p>
+        </p:txBody>
+      </p:sp>
+      <p:sp>
+        <p:nvSpPr>
+          <p:cNvPr id="4" name="Ellipse 3"/>
+          <p:cNvSpPr/>
+          <p:nvPr/>
+        </p:nvSpPr>
+        <p:spPr>
+          <a:xfrm>
+            <a:off x="7301925" y="2144069"/>
+            <a:ext cx="328474" cy="328474"/>
+          </a:xfrm>
+          <a:prstGeom prst="ellipse">
+            <a:avLst/>
+          </a:prstGeom>
+          <a:solidFill>
+            <a:schemeClr val="tx1"/>
+          </a:solidFill>
+        </p:spPr>
+        <p:style>
+          <a:lnRef idx="2">
+            <a:schemeClr val="accent1">
+              <a:shade val="50000"/>
+            </a:schemeClr>
+          </a:lnRef>
+          <a:fillRef idx="1">
+            <a:schemeClr val="accent1"/>
+          </a:fillRef>
+          <a:effectRef idx="0">
+            <a:schemeClr val="accent1"/>
+          </a:effectRef>
+          <a:fontRef idx="minor">
+            <a:schemeClr val="lt1"/>
+          </a:fontRef>
+        </p:style>
+        <p:txBody>
+          <a:bodyPr rtlCol="0" anchor="ctr"/>
+          <a:lstStyle/>
+          <a:p>
+            <a:pPr algn="ctr"/>
+            <a:r>
+              <a:rPr lang="en-US" dirty="0" smtClean="0"/>
+              <a:t>1</a:t>
+            </a:r>
+            <a:endParaRPr lang="en-US" dirty="0"/>
+          </a:p>
+        </p:txBody>
+      </p:sp>
+      <p:sp>
+        <p:nvSpPr>
+          <p:cNvPr id="5" name="Ellipse 4"/>
+          <p:cNvSpPr/>
+          <p:nvPr/>
+        </p:nvSpPr>
+        <p:spPr>
+          <a:xfrm>
+            <a:off x="8231819" y="845564"/>
+            <a:ext cx="328474" cy="328474"/>
+          </a:xfrm>
+          <a:prstGeom prst="ellipse">
+            <a:avLst/>
+          </a:prstGeom>
+          <a:solidFill>
+            <a:schemeClr val="tx1"/>
+          </a:solidFill>
+        </p:spPr>
+        <p:style>
+          <a:lnRef idx="2">
+            <a:schemeClr val="accent1">
+              <a:shade val="50000"/>
+            </a:schemeClr>
+          </a:lnRef>
+          <a:fillRef idx="1">
+            <a:schemeClr val="accent1"/>
+          </a:fillRef>
+          <a:effectRef idx="0">
+            <a:schemeClr val="accent1"/>
+          </a:effectRef>
+          <a:fontRef idx="minor">
+            <a:schemeClr val="lt1"/>
+          </a:fontRef>
+        </p:style>
+        <p:txBody>
+          <a:bodyPr rtlCol="0" anchor="ctr"/>
+          <a:lstStyle/>
+          <a:p>
+            <a:pPr algn="ctr"/>
+            <a:r>
+              <a:rPr lang="en-US" dirty="0"/>
+              <a:t>2</a:t>
+            </a:r>
+          </a:p>
+        </p:txBody>
+      </p:sp>
+      <p:sp>
+        <p:nvSpPr>
+          <p:cNvPr id="6" name="Ellipse 5"/>
+          <p:cNvSpPr/>
+          <p:nvPr/>
+        </p:nvSpPr>
+        <p:spPr>
+          <a:xfrm>
+            <a:off x="10150136" y="2192173"/>
+            <a:ext cx="328474" cy="328474"/>
+          </a:xfrm>
+          <a:prstGeom prst="ellipse">
+            <a:avLst/>
+          </a:prstGeom>
+          <a:solidFill>
+            <a:schemeClr val="tx1"/>
+          </a:solidFill>
+        </p:spPr>
+        <p:style>
+          <a:lnRef idx="2">
+            <a:schemeClr val="accent1">
+              <a:shade val="50000"/>
+            </a:schemeClr>
+          </a:lnRef>
+          <a:fillRef idx="1">
+            <a:schemeClr val="accent1"/>
+          </a:fillRef>
+          <a:effectRef idx="0">
+            <a:schemeClr val="accent1"/>
+          </a:effectRef>
+          <a:fontRef idx="minor">
+            <a:schemeClr val="lt1"/>
+          </a:fontRef>
+        </p:style>
+        <p:txBody>
+          <a:bodyPr rtlCol="0" anchor="ctr"/>
+          <a:lstStyle/>
+          <a:p>
+            <a:pPr algn="ctr"/>
+            <a:r>
+              <a:rPr lang="en-US" dirty="0" smtClean="0"/>
+              <a:t>3</a:t>
+            </a:r>
+            <a:endParaRPr lang="en-US" dirty="0"/>
+          </a:p>
+        </p:txBody>
+      </p:sp>
+      <p:cxnSp>
+        <p:nvCxnSpPr>
+          <p:cNvPr id="7" name="Gerader Verbinder 6"/>
+          <p:cNvCxnSpPr>
+            <a:stCxn id="4" idx="7"/>
+            <a:endCxn id="5" idx="3"/>
+          </p:cNvCxnSpPr>
+          <p:nvPr/>
+        </p:nvCxnSpPr>
+        <p:spPr>
+          <a:xfrm flipV="1">
+            <a:off x="7582295" y="1125934"/>
+            <a:ext cx="697628" cy="1066239"/>
+          </a:xfrm>
+          <a:prstGeom prst="line">
+            <a:avLst/>
+          </a:prstGeom>
+          <a:ln w="38100">
+            <a:solidFill>
+              <a:schemeClr val="tx1"/>
+            </a:solidFill>
+          </a:ln>
+        </p:spPr>
+        <p:style>
+          <a:lnRef idx="1">
+            <a:schemeClr val="accent1"/>
+          </a:lnRef>
+          <a:fillRef idx="0">
+            <a:schemeClr val="accent1"/>
+          </a:fillRef>
+          <a:effectRef idx="0">
+            <a:schemeClr val="accent1"/>
+          </a:effectRef>
+          <a:fontRef idx="minor">
+            <a:schemeClr val="tx1"/>
+          </a:fontRef>
+        </p:style>
+      </p:cxnSp>
+      <p:cxnSp>
+        <p:nvCxnSpPr>
+          <p:cNvPr id="8" name="Gerader Verbinder 7"/>
+          <p:cNvCxnSpPr>
+            <a:stCxn id="6" idx="1"/>
+            <a:endCxn id="5" idx="5"/>
+          </p:cNvCxnSpPr>
+          <p:nvPr/>
+        </p:nvCxnSpPr>
+        <p:spPr>
+          <a:xfrm flipH="1" flipV="1">
+            <a:off x="8512189" y="1125934"/>
+            <a:ext cx="1686051" cy="1114343"/>
+          </a:xfrm>
+          <a:prstGeom prst="line">
+            <a:avLst/>
+          </a:prstGeom>
+          <a:ln w="38100">
+            <a:solidFill>
+              <a:schemeClr val="tx1"/>
+            </a:solidFill>
+          </a:ln>
+        </p:spPr>
+        <p:style>
+          <a:lnRef idx="1">
+            <a:schemeClr val="accent1"/>
+          </a:lnRef>
+          <a:fillRef idx="0">
+            <a:schemeClr val="accent1"/>
+          </a:fillRef>
+          <a:effectRef idx="0">
+            <a:schemeClr val="accent1"/>
+          </a:effectRef>
+          <a:fontRef idx="minor">
+            <a:schemeClr val="tx1"/>
+          </a:fontRef>
+        </p:style>
+      </p:cxnSp>
+      <p:cxnSp>
+        <p:nvCxnSpPr>
+          <p:cNvPr id="9" name="Gerader Verbinder 8"/>
+          <p:cNvCxnSpPr>
+            <a:stCxn id="6" idx="2"/>
+            <a:endCxn id="4" idx="6"/>
+          </p:cNvCxnSpPr>
+          <p:nvPr/>
+        </p:nvCxnSpPr>
+        <p:spPr>
+          <a:xfrm flipH="1" flipV="1">
+            <a:off x="7630399" y="2308306"/>
+            <a:ext cx="2519737" cy="48104"/>
+          </a:xfrm>
+          <a:prstGeom prst="line">
+            <a:avLst/>
+          </a:prstGeom>
+          <a:ln w="38100">
+            <a:solidFill>
+              <a:schemeClr val="tx1"/>
+            </a:solidFill>
+          </a:ln>
+        </p:spPr>
+        <p:style>
+          <a:lnRef idx="1">
+            <a:schemeClr val="accent1"/>
+          </a:lnRef>
+          <a:fillRef idx="0">
+            <a:schemeClr val="accent1"/>
+          </a:fillRef>
+          <a:effectRef idx="0">
+            <a:schemeClr val="accent1"/>
+          </a:effectRef>
+          <a:fontRef idx="minor">
+            <a:schemeClr val="tx1"/>
+          </a:fontRef>
+        </p:style>
+      </p:cxnSp>
+      <p:sp>
+        <p:nvSpPr>
+          <p:cNvPr id="10" name="Textfeld 9"/>
+          <p:cNvSpPr txBox="1"/>
+          <p:nvPr/>
+        </p:nvSpPr>
+        <p:spPr>
+          <a:xfrm>
+            <a:off x="7543860" y="1390910"/>
+            <a:ext cx="418704" cy="369332"/>
+          </a:xfrm>
+          <a:prstGeom prst="rect">
+            <a:avLst/>
+          </a:prstGeom>
+          <a:noFill/>
+        </p:spPr>
+        <p:txBody>
+          <a:bodyPr wrap="none" rtlCol="0">
+            <a:spAutoFit/>
+          </a:bodyPr>
+          <a:lstStyle/>
+          <a:p>
+            <a:r>
+              <a:rPr lang="en-US" dirty="0" smtClean="0"/>
+              <a:t>10</a:t>
+            </a:r>
+            <a:endParaRPr lang="en-US" dirty="0"/>
+          </a:p>
+        </p:txBody>
+      </p:sp>
+      <p:sp>
+        <p:nvSpPr>
+          <p:cNvPr id="11" name="Textfeld 10"/>
+          <p:cNvSpPr txBox="1"/>
+          <p:nvPr/>
+        </p:nvSpPr>
+        <p:spPr>
+          <a:xfrm>
+            <a:off x="9355214" y="1342806"/>
+            <a:ext cx="418704" cy="369332"/>
+          </a:xfrm>
+          <a:prstGeom prst="rect">
+            <a:avLst/>
+          </a:prstGeom>
+          <a:noFill/>
+        </p:spPr>
+        <p:txBody>
+          <a:bodyPr wrap="none" rtlCol="0">
+            <a:spAutoFit/>
+          </a:bodyPr>
+          <a:lstStyle/>
+          <a:p>
+            <a:r>
+              <a:rPr lang="en-US" dirty="0"/>
+              <a:t>1</a:t>
+            </a:r>
+            <a:r>
+              <a:rPr lang="en-US" dirty="0" smtClean="0"/>
+              <a:t>5</a:t>
+            </a:r>
+            <a:endParaRPr lang="en-US" dirty="0"/>
+          </a:p>
+        </p:txBody>
+      </p:sp>
+      <p:sp>
+        <p:nvSpPr>
+          <p:cNvPr id="12" name="Textfeld 11"/>
+          <p:cNvSpPr txBox="1"/>
+          <p:nvPr/>
+        </p:nvSpPr>
+        <p:spPr>
+          <a:xfrm>
+            <a:off x="8681033" y="2335981"/>
+            <a:ext cx="418704" cy="369332"/>
+          </a:xfrm>
+          <a:prstGeom prst="rect">
+            <a:avLst/>
+          </a:prstGeom>
+          <a:noFill/>
+        </p:spPr>
+        <p:txBody>
+          <a:bodyPr wrap="none" rtlCol="0">
+            <a:spAutoFit/>
+          </a:bodyPr>
+          <a:lstStyle/>
+          <a:p>
+            <a:r>
+              <a:rPr lang="en-US" dirty="0" smtClean="0"/>
+              <a:t>10</a:t>
+            </a:r>
+            <a:endParaRPr lang="en-US" dirty="0"/>
+          </a:p>
+        </p:txBody>
+      </p:sp>
+      <p:sp>
+        <p:nvSpPr>
+          <p:cNvPr id="13" name="Textfeld 12"/>
+          <p:cNvSpPr txBox="1"/>
+          <p:nvPr/>
+        </p:nvSpPr>
+        <p:spPr>
+          <a:xfrm>
+            <a:off x="6956441" y="2469261"/>
+            <a:ext cx="699230" cy="369332"/>
+          </a:xfrm>
+          <a:prstGeom prst="rect">
+            <a:avLst/>
+          </a:prstGeom>
+          <a:noFill/>
+        </p:spPr>
+        <p:txBody>
+          <a:bodyPr wrap="none" rtlCol="0">
+            <a:spAutoFit/>
+          </a:bodyPr>
+          <a:lstStyle/>
+          <a:p>
+            <a:r>
+              <a:rPr lang="en-US" dirty="0" smtClean="0"/>
+              <a:t>w=10</a:t>
+            </a:r>
+            <a:endParaRPr lang="en-US" dirty="0"/>
+          </a:p>
+        </p:txBody>
+      </p:sp>
+      <p:sp>
+        <p:nvSpPr>
+          <p:cNvPr id="14" name="Textfeld 13"/>
+          <p:cNvSpPr txBox="1"/>
+          <p:nvPr/>
+        </p:nvSpPr>
+        <p:spPr>
+          <a:xfrm>
+            <a:off x="8046441" y="439783"/>
+            <a:ext cx="699230" cy="369332"/>
+          </a:xfrm>
+          <a:prstGeom prst="rect">
+            <a:avLst/>
+          </a:prstGeom>
+          <a:noFill/>
+        </p:spPr>
+        <p:txBody>
+          <a:bodyPr wrap="none" rtlCol="0">
+            <a:spAutoFit/>
+          </a:bodyPr>
+          <a:lstStyle/>
+          <a:p>
+            <a:r>
+              <a:rPr lang="en-US" dirty="0" smtClean="0"/>
+              <a:t>w=30</a:t>
+            </a:r>
+            <a:endParaRPr lang="en-US" dirty="0"/>
+          </a:p>
+        </p:txBody>
+      </p:sp>
+      <p:sp>
+        <p:nvSpPr>
+          <p:cNvPr id="15" name="Textfeld 14"/>
+          <p:cNvSpPr txBox="1"/>
+          <p:nvPr/>
+        </p:nvSpPr>
+        <p:spPr>
+          <a:xfrm>
+            <a:off x="10386454" y="2240277"/>
+            <a:ext cx="699230" cy="369332"/>
+          </a:xfrm>
+          <a:prstGeom prst="rect">
+            <a:avLst/>
+          </a:prstGeom>
+          <a:noFill/>
+        </p:spPr>
+        <p:txBody>
+          <a:bodyPr wrap="none" rtlCol="0">
+            <a:spAutoFit/>
+          </a:bodyPr>
+          <a:lstStyle/>
+          <a:p>
+            <a:r>
+              <a:rPr lang="en-US" dirty="0" smtClean="0"/>
+              <a:t>w=60</a:t>
+            </a:r>
+            <a:endParaRPr lang="en-US" dirty="0"/>
+          </a:p>
+        </p:txBody>
+      </p:sp>
+      <p:sp>
+        <p:nvSpPr>
+          <p:cNvPr id="16" name="Textfeld 15"/>
+          <p:cNvSpPr txBox="1"/>
+          <p:nvPr/>
+        </p:nvSpPr>
+        <p:spPr>
+          <a:xfrm>
+            <a:off x="6469508" y="952603"/>
+            <a:ext cx="1093569" cy="646331"/>
+          </a:xfrm>
+          <a:prstGeom prst="rect">
+            <a:avLst/>
+          </a:prstGeom>
+          <a:noFill/>
+        </p:spPr>
+        <p:txBody>
+          <a:bodyPr wrap="none" rtlCol="0">
+            <a:spAutoFit/>
+          </a:bodyPr>
+          <a:lstStyle/>
+          <a:p>
+            <a:r>
+              <a:rPr lang="en-US" dirty="0"/>
+              <a:t>r(e12) = </a:t>
+            </a:r>
+            <a:r>
+              <a:rPr lang="en-US" dirty="0" smtClean="0"/>
+              <a:t>1</a:t>
+            </a:r>
+            <a:endParaRPr lang="en-US" dirty="0" smtClean="0"/>
+          </a:p>
+          <a:p>
+            <a:pPr marL="0" lvl="1"/>
+            <a:r>
+              <a:rPr lang="en-US" dirty="0"/>
+              <a:t>r(e21) = </a:t>
+            </a:r>
+            <a:r>
+              <a:rPr lang="en-US" dirty="0" smtClean="0"/>
+              <a:t>3</a:t>
+            </a:r>
+            <a:endParaRPr lang="en-US" dirty="0"/>
+          </a:p>
+        </p:txBody>
+      </p:sp>
+      <p:sp>
+        <p:nvSpPr>
+          <p:cNvPr id="17" name="Textfeld 16"/>
+          <p:cNvSpPr txBox="1"/>
+          <p:nvPr/>
+        </p:nvSpPr>
+        <p:spPr>
+          <a:xfrm>
+            <a:off x="8343482" y="2653927"/>
+            <a:ext cx="1093569" cy="646331"/>
+          </a:xfrm>
+          <a:prstGeom prst="rect">
+            <a:avLst/>
+          </a:prstGeom>
+          <a:noFill/>
+        </p:spPr>
+        <p:txBody>
+          <a:bodyPr wrap="none" rtlCol="0">
+            <a:spAutoFit/>
+          </a:bodyPr>
+          <a:lstStyle/>
+          <a:p>
+            <a:r>
+              <a:rPr lang="en-US" dirty="0"/>
+              <a:t>r(e13) = </a:t>
+            </a:r>
+            <a:r>
+              <a:rPr lang="en-US" dirty="0" smtClean="0"/>
+              <a:t>1</a:t>
+            </a:r>
+          </a:p>
+          <a:p>
+            <a:pPr marL="0" lvl="1"/>
+            <a:r>
+              <a:rPr lang="en-US" dirty="0"/>
+              <a:t>r(e31) = </a:t>
+            </a:r>
+            <a:r>
+              <a:rPr lang="en-US" dirty="0" smtClean="0"/>
+              <a:t>6</a:t>
+            </a:r>
+            <a:endParaRPr lang="en-US" dirty="0"/>
+          </a:p>
+        </p:txBody>
+      </p:sp>
+      <p:sp>
+        <p:nvSpPr>
+          <p:cNvPr id="18" name="Textfeld 17"/>
+          <p:cNvSpPr txBox="1"/>
+          <p:nvPr/>
+        </p:nvSpPr>
+        <p:spPr>
+          <a:xfrm>
+            <a:off x="9829580" y="974463"/>
+            <a:ext cx="1093569" cy="646331"/>
+          </a:xfrm>
+          <a:prstGeom prst="rect">
+            <a:avLst/>
+          </a:prstGeom>
+          <a:noFill/>
+        </p:spPr>
+        <p:txBody>
+          <a:bodyPr wrap="none" rtlCol="0">
+            <a:spAutoFit/>
+          </a:bodyPr>
+          <a:lstStyle/>
+          <a:p>
+            <a:r>
+              <a:rPr lang="en-US" dirty="0"/>
+              <a:t>r(e23) = </a:t>
+            </a:r>
+            <a:r>
+              <a:rPr lang="en-US" dirty="0" smtClean="0"/>
+              <a:t>2</a:t>
+            </a:r>
+          </a:p>
+          <a:p>
+            <a:pPr marL="0" lvl="1"/>
+            <a:r>
+              <a:rPr lang="en-US" dirty="0"/>
+              <a:t>r(e32) = </a:t>
+            </a:r>
+            <a:r>
+              <a:rPr lang="en-US" dirty="0" smtClean="0"/>
+              <a:t>4</a:t>
+            </a:r>
+            <a:endParaRPr lang="en-US" dirty="0"/>
+          </a:p>
+        </p:txBody>
+      </p:sp>
+    </p:spTree>
+    <p:extLst>
+      <p:ext uri="{BB962C8B-B14F-4D97-AF65-F5344CB8AC3E}">
+        <p14:creationId xmlns:p14="http://schemas.microsoft.com/office/powerpoint/2010/main" val="2367440462"/>
+      </p:ext>
+    </p:extLst>
+  </p:cSld>
+  <p:clrMapOvr>
+    <a:masterClrMapping/>
+  </p:clrMapOvr>
+  <p:timing>
+    <p:tnLst>
+      <p:par>
+        <p:cTn id="1" dur="indefinite" restart="never" nodeType="tmRoot"/>
+      </p:par>
+    </p:tnLst>
+  </p:timing>
+</p:sld>
+</file>
+
 <file path=ppt/slides/slide2.xml><?xml version="1.0" encoding="utf-8"?>
 <p:sld xmlns:a="http://schemas.openxmlformats.org/drawingml/2006/main" xmlns:r="http://schemas.openxmlformats.org/officeDocument/2006/relationships" xmlns:p="http://schemas.openxmlformats.org/presentationml/2006/main">
   <p:cSld>
@@ -6967,11 +7644,7 @@
             </a:r>
             <a:r>
               <a:rPr lang="en-US" dirty="0" smtClean="0"/>
-              <a:t> D4 – </a:t>
-            </a:r>
-            <a:r>
-              <a:rPr lang="en-US" dirty="0" smtClean="0"/>
-              <a:t>Initial</a:t>
+              <a:t> D4 – Initial</a:t>
             </a:r>
             <a:endParaRPr lang="en-US" dirty="0"/>
           </a:p>
@@ -9041,11 +9714,7 @@
           <a:p>
             <a:r>
               <a:rPr lang="en-US" dirty="0" smtClean="0"/>
-              <a:t>Inactive </a:t>
-            </a:r>
-            <a:r>
-              <a:rPr lang="en-US" dirty="0" smtClean="0"/>
-              <a:t>links after first TC iteration (k=2.0): e1-3,e2-3,e2-4,e2-5,e3-9,e3-11,e9-11</a:t>
+              <a:t>Inactive links after first TC iteration (k=2.0): e1-3,e2-3,e2-4,e2-5,e3-9,e3-11,e9-11</a:t>
             </a:r>
             <a:endParaRPr lang="en-US" dirty="0"/>
           </a:p>

</xml_diff>

<commit_message>
Rename and add testgraph D5
</commit_message>
<xml_diff>
--- a/de.tudarmstadt.maki.modeling.jvlc/instances/testgraphs.pptx
+++ b/de.tudarmstadt.maki.modeling.jvlc/instances/testgraphs.pptx
@@ -14,9 +14,10 @@
     <p:sldId id="264" r:id="rId8"/>
     <p:sldId id="263" r:id="rId9"/>
     <p:sldId id="265" r:id="rId10"/>
-    <p:sldId id="259" r:id="rId11"/>
-    <p:sldId id="260" r:id="rId12"/>
-    <p:sldId id="267" r:id="rId13"/>
+    <p:sldId id="268" r:id="rId11"/>
+    <p:sldId id="259" r:id="rId12"/>
+    <p:sldId id="260" r:id="rId13"/>
+    <p:sldId id="267" r:id="rId14"/>
   </p:sldIdLst>
   <p:sldSz cx="12192000" cy="6858000"/>
   <p:notesSz cx="6858000" cy="9144000"/>
@@ -129,6 +130,7 @@
             <p14:sldId id="264"/>
             <p14:sldId id="263"/>
             <p14:sldId id="265"/>
+            <p14:sldId id="268"/>
           </p14:sldIdLst>
         </p14:section>
         <p14:section name="Testgraphs for e-kTC" id="{893D8346-A827-4FEC-9989-0B78EDAA378C}">
@@ -289,7 +291,7 @@
           <a:p>
             <a:fld id="{AA2F2A37-85DD-45B9-AC18-C6701B3AEA4C}" type="datetimeFigureOut">
               <a:rPr lang="en-US" smtClean="0"/>
-              <a:t>11/10/2015</a:t>
+              <a:t>4/26/2016</a:t>
             </a:fld>
             <a:endParaRPr lang="en-US"/>
           </a:p>
@@ -542,7 +544,7 @@
           <a:p>
             <a:fld id="{AA2F2A37-85DD-45B9-AC18-C6701B3AEA4C}" type="datetimeFigureOut">
               <a:rPr lang="en-US" smtClean="0"/>
-              <a:t>11/10/2015</a:t>
+              <a:t>4/26/2016</a:t>
             </a:fld>
             <a:endParaRPr lang="en-US"/>
           </a:p>
@@ -712,7 +714,7 @@
           <a:p>
             <a:fld id="{AA2F2A37-85DD-45B9-AC18-C6701B3AEA4C}" type="datetimeFigureOut">
               <a:rPr lang="en-US" smtClean="0"/>
-              <a:t>11/10/2015</a:t>
+              <a:t>4/26/2016</a:t>
             </a:fld>
             <a:endParaRPr lang="en-US"/>
           </a:p>
@@ -892,7 +894,7 @@
           <a:p>
             <a:fld id="{AA2F2A37-85DD-45B9-AC18-C6701B3AEA4C}" type="datetimeFigureOut">
               <a:rPr lang="en-US" smtClean="0"/>
-              <a:t>11/10/2015</a:t>
+              <a:t>4/26/2016</a:t>
             </a:fld>
             <a:endParaRPr lang="en-US"/>
           </a:p>
@@ -1062,7 +1064,7 @@
           <a:p>
             <a:fld id="{AA2F2A37-85DD-45B9-AC18-C6701B3AEA4C}" type="datetimeFigureOut">
               <a:rPr lang="en-US" smtClean="0"/>
-              <a:t>11/10/2015</a:t>
+              <a:t>4/26/2016</a:t>
             </a:fld>
             <a:endParaRPr lang="en-US"/>
           </a:p>
@@ -1251,7 +1253,7 @@
           <a:p>
             <a:fld id="{AA2F2A37-85DD-45B9-AC18-C6701B3AEA4C}" type="datetimeFigureOut">
               <a:rPr lang="en-US" smtClean="0"/>
-              <a:t>11/10/2015</a:t>
+              <a:t>4/26/2016</a:t>
             </a:fld>
             <a:endParaRPr lang="en-US"/>
           </a:p>
@@ -1504,7 +1506,7 @@
           <a:p>
             <a:fld id="{AA2F2A37-85DD-45B9-AC18-C6701B3AEA4C}" type="datetimeFigureOut">
               <a:rPr lang="en-US" smtClean="0"/>
-              <a:t>11/10/2015</a:t>
+              <a:t>4/26/2016</a:t>
             </a:fld>
             <a:endParaRPr lang="en-US"/>
           </a:p>
@@ -1736,7 +1738,7 @@
           <a:p>
             <a:fld id="{AA2F2A37-85DD-45B9-AC18-C6701B3AEA4C}" type="datetimeFigureOut">
               <a:rPr lang="en-US" smtClean="0"/>
-              <a:t>11/10/2015</a:t>
+              <a:t>4/26/2016</a:t>
             </a:fld>
             <a:endParaRPr lang="en-US"/>
           </a:p>
@@ -2103,7 +2105,7 @@
           <a:p>
             <a:fld id="{AA2F2A37-85DD-45B9-AC18-C6701B3AEA4C}" type="datetimeFigureOut">
               <a:rPr lang="en-US" smtClean="0"/>
-              <a:t>11/10/2015</a:t>
+              <a:t>4/26/2016</a:t>
             </a:fld>
             <a:endParaRPr lang="en-US"/>
           </a:p>
@@ -2221,7 +2223,7 @@
           <a:p>
             <a:fld id="{AA2F2A37-85DD-45B9-AC18-C6701B3AEA4C}" type="datetimeFigureOut">
               <a:rPr lang="en-US" smtClean="0"/>
-              <a:t>11/10/2015</a:t>
+              <a:t>4/26/2016</a:t>
             </a:fld>
             <a:endParaRPr lang="en-US"/>
           </a:p>
@@ -2323,7 +2325,7 @@
           <a:p>
             <a:fld id="{AA2F2A37-85DD-45B9-AC18-C6701B3AEA4C}" type="datetimeFigureOut">
               <a:rPr lang="en-US" smtClean="0"/>
-              <a:t>11/10/2015</a:t>
+              <a:t>4/26/2016</a:t>
             </a:fld>
             <a:endParaRPr lang="en-US"/>
           </a:p>
@@ -2600,7 +2602,7 @@
           <a:p>
             <a:fld id="{AA2F2A37-85DD-45B9-AC18-C6701B3AEA4C}" type="datetimeFigureOut">
               <a:rPr lang="en-US" smtClean="0"/>
-              <a:t>11/10/2015</a:t>
+              <a:t>4/26/2016</a:t>
             </a:fld>
             <a:endParaRPr lang="en-US"/>
           </a:p>
@@ -2813,7 +2815,7 @@
           <a:p>
             <a:fld id="{AA2F2A37-85DD-45B9-AC18-C6701B3AEA4C}" type="datetimeFigureOut">
               <a:rPr lang="en-US" smtClean="0"/>
-              <a:t>11/10/2015</a:t>
+              <a:t>4/26/2016</a:t>
             </a:fld>
             <a:endParaRPr lang="en-US"/>
           </a:p>
@@ -4048,14 +4050,10 @@
           <a:lstStyle/>
           <a:p>
             <a:r>
-              <a:rPr lang="en-US" dirty="0" err="1" smtClean="0"/>
-              <a:t>Testgraph</a:t>
-            </a:r>
-            <a:r>
-              <a:rPr lang="en-US" dirty="0" smtClean="0"/>
-              <a:t> E1</a:t>
-            </a:r>
-            <a:endParaRPr lang="en-US" dirty="0"/>
+              <a:rPr lang="en-US" smtClean="0"/>
+              <a:t>Testgraph D5</a:t>
+            </a:r>
+            <a:endParaRPr lang="en-US"/>
           </a:p>
         </p:txBody>
       </p:sp>
@@ -4074,59 +4072,7 @@
           <a:bodyPr/>
           <a:lstStyle/>
           <a:p>
-            <a:r>
-              <a:rPr lang="en-US" smtClean="0"/>
-              <a:t>Simple test case for e-ktc</a:t>
-            </a:r>
-          </a:p>
-          <a:p>
-            <a:r>
-              <a:rPr lang="en-US" smtClean="0"/>
-              <a:t>Cases (k=1.5)</a:t>
-            </a:r>
-          </a:p>
-          <a:p>
-            <a:pPr lvl="1"/>
-            <a:r>
-              <a:rPr lang="en-US" smtClean="0"/>
-              <a:t>e13-e12-e23 =&gt; I</a:t>
-            </a:r>
-          </a:p>
-          <a:p>
-            <a:pPr lvl="1"/>
-            <a:r>
-              <a:rPr lang="en-US" smtClean="0"/>
-              <a:t>e32-e21-e13 =&gt; A</a:t>
-            </a:r>
-          </a:p>
-          <a:p>
-            <a:pPr lvl="1"/>
-            <a:r>
-              <a:rPr lang="en-US" smtClean="0"/>
-              <a:t>e21-e23-e31 =&gt; A</a:t>
-            </a:r>
-          </a:p>
-          <a:p>
-            <a:pPr lvl="1"/>
-            <a:r>
-              <a:rPr lang="en-US" smtClean="0"/>
-              <a:t>e31-e32-e21 =&gt; A</a:t>
-            </a:r>
-          </a:p>
-          <a:p>
-            <a:pPr lvl="1"/>
-            <a:r>
-              <a:rPr lang="en-US" smtClean="0"/>
-              <a:t>e12-e13-e32 =&gt; A</a:t>
-            </a:r>
-          </a:p>
-          <a:p>
-            <a:pPr lvl="1"/>
-            <a:r>
-              <a:rPr lang="en-US" smtClean="0"/>
-              <a:t>e23-e21-e13 =&gt; A</a:t>
-            </a:r>
-            <a:endParaRPr lang="en-US" dirty="0" smtClean="0"/>
+            <a:endParaRPr lang="en-US"/>
           </a:p>
         </p:txBody>
       </p:sp>
@@ -4138,7 +4084,7 @@
         </p:nvSpPr>
         <p:spPr>
           <a:xfrm>
-            <a:off x="7301925" y="2144069"/>
+            <a:off x="7391400" y="3956000"/>
             <a:ext cx="328474" cy="328474"/>
           </a:xfrm>
           <a:prstGeom prst="ellipse">
@@ -4147,6 +4093,11 @@
           <a:solidFill>
             <a:schemeClr val="tx1"/>
           </a:solidFill>
+          <a:ln>
+            <a:solidFill>
+              <a:schemeClr val="tx1"/>
+            </a:solidFill>
+          </a:ln>
         </p:spPr>
         <p:style>
           <a:lnRef idx="2">
@@ -4185,7 +4136,7 @@
         </p:nvSpPr>
         <p:spPr>
           <a:xfrm>
-            <a:off x="8231819" y="845564"/>
+            <a:off x="8052039" y="3202841"/>
             <a:ext cx="328474" cy="328474"/>
           </a:xfrm>
           <a:prstGeom prst="ellipse">
@@ -4194,6 +4145,11 @@
           <a:solidFill>
             <a:schemeClr val="tx1"/>
           </a:solidFill>
+          <a:ln>
+            <a:solidFill>
+              <a:schemeClr val="tx1"/>
+            </a:solidFill>
+          </a:ln>
         </p:spPr>
         <p:style>
           <a:lnRef idx="2">
@@ -4231,7 +4187,7 @@
         </p:nvSpPr>
         <p:spPr>
           <a:xfrm>
-            <a:off x="10150136" y="2192173"/>
+            <a:off x="8641319" y="3912661"/>
             <a:ext cx="328474" cy="328474"/>
           </a:xfrm>
           <a:prstGeom prst="ellipse">
@@ -4240,6 +4196,11 @@
           <a:solidFill>
             <a:schemeClr val="tx1"/>
           </a:solidFill>
+          <a:ln>
+            <a:solidFill>
+              <a:schemeClr val="tx1"/>
+            </a:solidFill>
+          </a:ln>
         </p:spPr>
         <p:style>
           <a:lnRef idx="2">
@@ -4270,19 +4231,122 @@
           </a:p>
         </p:txBody>
       </p:sp>
+      <p:sp>
+        <p:nvSpPr>
+          <p:cNvPr id="7" name="Ellipse 6"/>
+          <p:cNvSpPr/>
+          <p:nvPr/>
+        </p:nvSpPr>
+        <p:spPr>
+          <a:xfrm>
+            <a:off x="7935906" y="4671631"/>
+            <a:ext cx="328474" cy="328474"/>
+          </a:xfrm>
+          <a:prstGeom prst="ellipse">
+            <a:avLst/>
+          </a:prstGeom>
+          <a:solidFill>
+            <a:schemeClr val="tx1"/>
+          </a:solidFill>
+          <a:ln>
+            <a:solidFill>
+              <a:schemeClr val="tx1"/>
+            </a:solidFill>
+          </a:ln>
+        </p:spPr>
+        <p:style>
+          <a:lnRef idx="2">
+            <a:schemeClr val="accent1">
+              <a:shade val="50000"/>
+            </a:schemeClr>
+          </a:lnRef>
+          <a:fillRef idx="1">
+            <a:schemeClr val="accent1"/>
+          </a:fillRef>
+          <a:effectRef idx="0">
+            <a:schemeClr val="accent1"/>
+          </a:effectRef>
+          <a:fontRef idx="minor">
+            <a:schemeClr val="lt1"/>
+          </a:fontRef>
+        </p:style>
+        <p:txBody>
+          <a:bodyPr rtlCol="0" anchor="ctr"/>
+          <a:lstStyle/>
+          <a:p>
+            <a:pPr algn="ctr"/>
+            <a:r>
+              <a:rPr lang="en-US" dirty="0"/>
+              <a:t>4</a:t>
+            </a:r>
+          </a:p>
+        </p:txBody>
+      </p:sp>
+      <p:sp>
+        <p:nvSpPr>
+          <p:cNvPr id="8" name="Ellipse 7"/>
+          <p:cNvSpPr/>
+          <p:nvPr/>
+        </p:nvSpPr>
+        <p:spPr>
+          <a:xfrm>
+            <a:off x="6884267" y="4835868"/>
+            <a:ext cx="328474" cy="328474"/>
+          </a:xfrm>
+          <a:prstGeom prst="ellipse">
+            <a:avLst/>
+          </a:prstGeom>
+          <a:solidFill>
+            <a:schemeClr val="tx1"/>
+          </a:solidFill>
+          <a:ln>
+            <a:solidFill>
+              <a:schemeClr val="tx1"/>
+            </a:solidFill>
+          </a:ln>
+        </p:spPr>
+        <p:style>
+          <a:lnRef idx="2">
+            <a:schemeClr val="accent1">
+              <a:shade val="50000"/>
+            </a:schemeClr>
+          </a:lnRef>
+          <a:fillRef idx="1">
+            <a:schemeClr val="accent1"/>
+          </a:fillRef>
+          <a:effectRef idx="0">
+            <a:schemeClr val="accent1"/>
+          </a:effectRef>
+          <a:fontRef idx="minor">
+            <a:schemeClr val="lt1"/>
+          </a:fontRef>
+        </p:style>
+        <p:txBody>
+          <a:bodyPr rtlCol="0" anchor="ctr"/>
+          <a:lstStyle/>
+          <a:p>
+            <a:pPr algn="ctr"/>
+            <a:r>
+              <a:rPr lang="en-US" dirty="0" smtClean="0"/>
+              <a:t>5</a:t>
+            </a:r>
+            <a:endParaRPr lang="en-US" dirty="0"/>
+          </a:p>
+        </p:txBody>
+      </p:sp>
       <p:cxnSp>
         <p:nvCxnSpPr>
-          <p:cNvPr id="7" name="Gerader Verbinder 6"/>
+          <p:cNvPr id="9" name="Gerader Verbinder 8"/>
           <p:cNvCxnSpPr>
-            <a:stCxn id="4" idx="7"/>
-            <a:endCxn id="5" idx="3"/>
+            <a:stCxn id="8" idx="6"/>
+            <a:endCxn id="7" idx="2"/>
           </p:cNvCxnSpPr>
           <p:nvPr/>
         </p:nvCxnSpPr>
         <p:spPr>
           <a:xfrm flipV="1">
-            <a:off x="7582295" y="1125934"/>
-            <a:ext cx="697628" cy="1066239"/>
+            <a:off x="7212741" y="4835868"/>
+            <a:ext cx="723165" cy="164237"/>
           </a:xfrm>
           <a:prstGeom prst="line">
             <a:avLst/>
@@ -4310,17 +4374,17 @@
       </p:cxnSp>
       <p:cxnSp>
         <p:nvCxnSpPr>
-          <p:cNvPr id="8" name="Gerader Verbinder 7"/>
+          <p:cNvPr id="13" name="Gerader Verbinder 12"/>
           <p:cNvCxnSpPr>
-            <a:stCxn id="6" idx="1"/>
-            <a:endCxn id="5" idx="5"/>
+            <a:stCxn id="4" idx="3"/>
+            <a:endCxn id="8" idx="7"/>
           </p:cNvCxnSpPr>
           <p:nvPr/>
         </p:nvCxnSpPr>
         <p:spPr>
-          <a:xfrm flipH="1" flipV="1">
-            <a:off x="8512189" y="1125934"/>
-            <a:ext cx="1686051" cy="1114343"/>
+          <a:xfrm flipH="1">
+            <a:off x="7164637" y="4236370"/>
+            <a:ext cx="274867" cy="647602"/>
           </a:xfrm>
           <a:prstGeom prst="line">
             <a:avLst/>
@@ -4348,7 +4412,159 @@
       </p:cxnSp>
       <p:cxnSp>
         <p:nvCxnSpPr>
-          <p:cNvPr id="9" name="Gerader Verbinder 8"/>
+          <p:cNvPr id="16" name="Gerader Verbinder 15"/>
+          <p:cNvCxnSpPr>
+            <a:stCxn id="7" idx="0"/>
+            <a:endCxn id="6" idx="1"/>
+          </p:cNvCxnSpPr>
+          <p:nvPr/>
+        </p:nvCxnSpPr>
+        <p:spPr>
+          <a:xfrm flipV="1">
+            <a:off x="8100143" y="3960765"/>
+            <a:ext cx="589280" cy="710866"/>
+          </a:xfrm>
+          <a:prstGeom prst="line">
+            <a:avLst/>
+          </a:prstGeom>
+          <a:ln w="38100">
+            <a:solidFill>
+              <a:schemeClr val="tx1"/>
+            </a:solidFill>
+          </a:ln>
+        </p:spPr>
+        <p:style>
+          <a:lnRef idx="1">
+            <a:schemeClr val="accent1"/>
+          </a:lnRef>
+          <a:fillRef idx="0">
+            <a:schemeClr val="accent1"/>
+          </a:fillRef>
+          <a:effectRef idx="0">
+            <a:schemeClr val="accent1"/>
+          </a:effectRef>
+          <a:fontRef idx="minor">
+            <a:schemeClr val="tx1"/>
+          </a:fontRef>
+        </p:style>
+      </p:cxnSp>
+      <p:cxnSp>
+        <p:nvCxnSpPr>
+          <p:cNvPr id="19" name="Gerader Verbinder 18"/>
+          <p:cNvCxnSpPr>
+            <a:stCxn id="7" idx="0"/>
+            <a:endCxn id="4" idx="5"/>
+          </p:cNvCxnSpPr>
+          <p:nvPr/>
+        </p:nvCxnSpPr>
+        <p:spPr>
+          <a:xfrm flipH="1" flipV="1">
+            <a:off x="7671770" y="4236370"/>
+            <a:ext cx="428373" cy="435261"/>
+          </a:xfrm>
+          <a:prstGeom prst="line">
+            <a:avLst/>
+          </a:prstGeom>
+          <a:ln w="38100">
+            <a:solidFill>
+              <a:schemeClr val="tx1"/>
+            </a:solidFill>
+          </a:ln>
+        </p:spPr>
+        <p:style>
+          <a:lnRef idx="1">
+            <a:schemeClr val="accent1"/>
+          </a:lnRef>
+          <a:fillRef idx="0">
+            <a:schemeClr val="accent1"/>
+          </a:fillRef>
+          <a:effectRef idx="0">
+            <a:schemeClr val="accent1"/>
+          </a:effectRef>
+          <a:fontRef idx="minor">
+            <a:schemeClr val="tx1"/>
+          </a:fontRef>
+        </p:style>
+      </p:cxnSp>
+      <p:cxnSp>
+        <p:nvCxnSpPr>
+          <p:cNvPr id="22" name="Gerader Verbinder 21"/>
+          <p:cNvCxnSpPr>
+            <a:stCxn id="6" idx="1"/>
+            <a:endCxn id="5" idx="5"/>
+          </p:cNvCxnSpPr>
+          <p:nvPr/>
+        </p:nvCxnSpPr>
+        <p:spPr>
+          <a:xfrm flipH="1" flipV="1">
+            <a:off x="8332409" y="3483211"/>
+            <a:ext cx="357014" cy="477554"/>
+          </a:xfrm>
+          <a:prstGeom prst="line">
+            <a:avLst/>
+          </a:prstGeom>
+          <a:ln w="38100">
+            <a:solidFill>
+              <a:schemeClr val="tx1"/>
+            </a:solidFill>
+          </a:ln>
+        </p:spPr>
+        <p:style>
+          <a:lnRef idx="1">
+            <a:schemeClr val="accent1"/>
+          </a:lnRef>
+          <a:fillRef idx="0">
+            <a:schemeClr val="accent1"/>
+          </a:fillRef>
+          <a:effectRef idx="0">
+            <a:schemeClr val="accent1"/>
+          </a:effectRef>
+          <a:fontRef idx="minor">
+            <a:schemeClr val="tx1"/>
+          </a:fontRef>
+        </p:style>
+      </p:cxnSp>
+      <p:cxnSp>
+        <p:nvCxnSpPr>
+          <p:cNvPr id="25" name="Gerader Verbinder 24"/>
+          <p:cNvCxnSpPr>
+            <a:stCxn id="5" idx="3"/>
+            <a:endCxn id="4" idx="0"/>
+          </p:cNvCxnSpPr>
+          <p:nvPr/>
+        </p:nvCxnSpPr>
+        <p:spPr>
+          <a:xfrm flipH="1">
+            <a:off x="7555637" y="3483211"/>
+            <a:ext cx="544506" cy="472789"/>
+          </a:xfrm>
+          <a:prstGeom prst="line">
+            <a:avLst/>
+          </a:prstGeom>
+          <a:ln w="38100">
+            <a:solidFill>
+              <a:schemeClr val="tx1"/>
+            </a:solidFill>
+          </a:ln>
+        </p:spPr>
+        <p:style>
+          <a:lnRef idx="1">
+            <a:schemeClr val="accent1"/>
+          </a:lnRef>
+          <a:fillRef idx="0">
+            <a:schemeClr val="accent1"/>
+          </a:fillRef>
+          <a:effectRef idx="0">
+            <a:schemeClr val="accent1"/>
+          </a:effectRef>
+          <a:fontRef idx="minor">
+            <a:schemeClr val="tx1"/>
+          </a:fontRef>
+        </p:style>
+      </p:cxnSp>
+      <p:cxnSp>
+        <p:nvCxnSpPr>
+          <p:cNvPr id="28" name="Gerader Verbinder 27"/>
           <p:cNvCxnSpPr>
             <a:stCxn id="6" idx="2"/>
             <a:endCxn id="4" idx="6"/>
@@ -4356,9 +4572,9 @@
           <p:nvPr/>
         </p:nvCxnSpPr>
         <p:spPr>
-          <a:xfrm flipH="1" flipV="1">
-            <a:off x="7630399" y="2308306"/>
-            <a:ext cx="2519737" cy="48104"/>
+          <a:xfrm flipH="1">
+            <a:off x="7719874" y="4076898"/>
+            <a:ext cx="921445" cy="43339"/>
           </a:xfrm>
           <a:prstGeom prst="line">
             <a:avLst/>
@@ -4386,43 +4602,13 @@
       </p:cxnSp>
       <p:sp>
         <p:nvSpPr>
-          <p:cNvPr id="10" name="Textfeld 9"/>
+          <p:cNvPr id="44" name="Textfeld 43"/>
           <p:cNvSpPr txBox="1"/>
           <p:nvPr/>
         </p:nvSpPr>
         <p:spPr>
           <a:xfrm>
-            <a:off x="7543860" y="1390910"/>
-            <a:ext cx="301686" cy="369332"/>
-          </a:xfrm>
-          <a:prstGeom prst="rect">
-            <a:avLst/>
-          </a:prstGeom>
-          <a:noFill/>
-        </p:spPr>
-        <p:txBody>
-          <a:bodyPr wrap="none" rtlCol="0">
-            <a:spAutoFit/>
-          </a:bodyPr>
-          <a:lstStyle/>
-          <a:p>
-            <a:r>
-              <a:rPr lang="en-US" dirty="0" smtClean="0"/>
-              <a:t>5</a:t>
-            </a:r>
-            <a:endParaRPr lang="en-US" dirty="0"/>
-          </a:p>
-        </p:txBody>
-      </p:sp>
-      <p:sp>
-        <p:nvSpPr>
-          <p:cNvPr id="11" name="Textfeld 10"/>
-          <p:cNvSpPr txBox="1"/>
-          <p:nvPr/>
-        </p:nvSpPr>
-        <p:spPr>
-          <a:xfrm>
-            <a:off x="9355214" y="1342806"/>
+            <a:off x="6852104" y="4350403"/>
             <a:ext cx="418704" cy="369332"/>
           </a:xfrm>
           <a:prstGeom prst="rect">
@@ -4437,12 +4623,8 @@
           <a:lstStyle/>
           <a:p>
             <a:r>
-              <a:rPr lang="en-US" dirty="0"/>
-              <a:t>1</a:t>
-            </a:r>
-            <a:r>
               <a:rPr lang="en-US" dirty="0" smtClean="0"/>
-              <a:t>5</a:t>
+              <a:t>30</a:t>
             </a:r>
             <a:endParaRPr lang="en-US" dirty="0"/>
           </a:p>
@@ -4450,13 +4632,13 @@
       </p:sp>
       <p:sp>
         <p:nvSpPr>
-          <p:cNvPr id="12" name="Textfeld 11"/>
+          <p:cNvPr id="45" name="Textfeld 44"/>
           <p:cNvSpPr txBox="1"/>
           <p:nvPr/>
         </p:nvSpPr>
         <p:spPr>
           <a:xfrm>
-            <a:off x="8681033" y="2335981"/>
+            <a:off x="7449466" y="4853693"/>
             <a:ext cx="418704" cy="369332"/>
           </a:xfrm>
           <a:prstGeom prst="rect">
@@ -4471,8 +4653,8 @@
           <a:lstStyle/>
           <a:p>
             <a:r>
-              <a:rPr lang="en-US" dirty="0" smtClean="0"/>
-              <a:t>10</a:t>
+              <a:rPr lang="en-US" smtClean="0"/>
+              <a:t>27</a:t>
             </a:r>
             <a:endParaRPr lang="en-US" dirty="0"/>
           </a:p>
@@ -4480,14 +4662,14 @@
       </p:sp>
       <p:sp>
         <p:nvSpPr>
-          <p:cNvPr id="13" name="Textfeld 12"/>
+          <p:cNvPr id="46" name="Textfeld 45"/>
           <p:cNvSpPr txBox="1"/>
           <p:nvPr/>
         </p:nvSpPr>
         <p:spPr>
           <a:xfrm>
-            <a:off x="6956441" y="2469261"/>
-            <a:ext cx="699230" cy="369332"/>
+            <a:off x="8319164" y="4316198"/>
+            <a:ext cx="418704" cy="369332"/>
           </a:xfrm>
           <a:prstGeom prst="rect">
             <a:avLst/>
@@ -4501,8 +4683,8 @@
           <a:lstStyle/>
           <a:p>
             <a:r>
-              <a:rPr lang="en-US" dirty="0" smtClean="0"/>
-              <a:t>w=10</a:t>
+              <a:rPr lang="en-US" smtClean="0"/>
+              <a:t>22</a:t>
             </a:r>
             <a:endParaRPr lang="en-US" dirty="0"/>
           </a:p>
@@ -4510,14 +4692,14 @@
       </p:sp>
       <p:sp>
         <p:nvSpPr>
-          <p:cNvPr id="14" name="Textfeld 13"/>
+          <p:cNvPr id="47" name="Textfeld 46"/>
           <p:cNvSpPr txBox="1"/>
           <p:nvPr/>
         </p:nvSpPr>
         <p:spPr>
           <a:xfrm>
-            <a:off x="8046441" y="439783"/>
-            <a:ext cx="699230" cy="369332"/>
+            <a:off x="7486470" y="4279302"/>
+            <a:ext cx="418704" cy="369332"/>
           </a:xfrm>
           <a:prstGeom prst="rect">
             <a:avLst/>
@@ -4531,8 +4713,8 @@
           <a:lstStyle/>
           <a:p>
             <a:r>
-              <a:rPr lang="en-US" dirty="0" smtClean="0"/>
-              <a:t>w=30</a:t>
+              <a:rPr lang="en-US" smtClean="0"/>
+              <a:t>25</a:t>
             </a:r>
             <a:endParaRPr lang="en-US" dirty="0"/>
           </a:p>
@@ -4540,14 +4722,14 @@
       </p:sp>
       <p:sp>
         <p:nvSpPr>
-          <p:cNvPr id="15" name="Textfeld 14"/>
+          <p:cNvPr id="48" name="Textfeld 47"/>
           <p:cNvSpPr txBox="1"/>
           <p:nvPr/>
         </p:nvSpPr>
         <p:spPr>
           <a:xfrm>
-            <a:off x="10386454" y="2240277"/>
-            <a:ext cx="699230" cy="369332"/>
+            <a:off x="7942245" y="3759818"/>
+            <a:ext cx="418704" cy="369332"/>
           </a:xfrm>
           <a:prstGeom prst="rect">
             <a:avLst/>
@@ -4561,8 +4743,8 @@
           <a:lstStyle/>
           <a:p>
             <a:r>
-              <a:rPr lang="en-US" dirty="0" smtClean="0"/>
-              <a:t>w=60</a:t>
+              <a:rPr lang="en-US" smtClean="0"/>
+              <a:t>20</a:t>
             </a:r>
             <a:endParaRPr lang="en-US" dirty="0"/>
           </a:p>
@@ -4570,14 +4752,14 @@
       </p:sp>
       <p:sp>
         <p:nvSpPr>
-          <p:cNvPr id="16" name="Textfeld 15"/>
+          <p:cNvPr id="50" name="Textfeld 49"/>
           <p:cNvSpPr txBox="1"/>
           <p:nvPr/>
         </p:nvSpPr>
         <p:spPr>
           <a:xfrm>
-            <a:off x="6469508" y="952603"/>
-            <a:ext cx="1093569" cy="646331"/>
+            <a:off x="8462259" y="3413359"/>
+            <a:ext cx="418704" cy="369332"/>
           </a:xfrm>
           <a:prstGeom prst="rect">
             <a:avLst/>
@@ -4591,20 +4773,8 @@
           <a:lstStyle/>
           <a:p>
             <a:r>
-              <a:rPr lang="en-US" dirty="0"/>
-              <a:t>r(e12) = 2</a:t>
-            </a:r>
-            <a:endParaRPr lang="en-US" dirty="0" smtClean="0"/>
-          </a:p>
-          <a:p>
-            <a:pPr marL="0" lvl="1"/>
-            <a:r>
-              <a:rPr lang="en-US" dirty="0"/>
-              <a:t>r(e21) = </a:t>
-            </a:r>
-            <a:r>
-              <a:rPr lang="en-US" dirty="0" smtClean="0"/>
-              <a:t>6</a:t>
+              <a:rPr lang="en-US" smtClean="0"/>
+              <a:t>17</a:t>
             </a:r>
             <a:endParaRPr lang="en-US" dirty="0"/>
           </a:p>
@@ -4612,14 +4782,14 @@
       </p:sp>
       <p:sp>
         <p:nvSpPr>
-          <p:cNvPr id="17" name="Textfeld 16"/>
+          <p:cNvPr id="51" name="Textfeld 50"/>
           <p:cNvSpPr txBox="1"/>
           <p:nvPr/>
         </p:nvSpPr>
         <p:spPr>
           <a:xfrm>
-            <a:off x="8343482" y="2653927"/>
-            <a:ext cx="1093569" cy="646331"/>
+            <a:off x="7472886" y="3431869"/>
+            <a:ext cx="418704" cy="369332"/>
           </a:xfrm>
           <a:prstGeom prst="rect">
             <a:avLst/>
@@ -4633,68 +4803,8 @@
           <a:lstStyle/>
           <a:p>
             <a:r>
-              <a:rPr lang="en-US" dirty="0"/>
-              <a:t>r(e13) = </a:t>
-            </a:r>
-            <a:r>
-              <a:rPr lang="en-US" dirty="0" smtClean="0"/>
-              <a:t>1</a:t>
-            </a:r>
-          </a:p>
-          <a:p>
-            <a:pPr marL="0" lvl="1"/>
-            <a:r>
-              <a:rPr lang="en-US" dirty="0"/>
-              <a:t>r(e31) = </a:t>
-            </a:r>
-            <a:r>
-              <a:rPr lang="en-US" dirty="0" smtClean="0"/>
-              <a:t>6</a:t>
-            </a:r>
-            <a:endParaRPr lang="en-US" dirty="0"/>
-          </a:p>
-        </p:txBody>
-      </p:sp>
-      <p:sp>
-        <p:nvSpPr>
-          <p:cNvPr id="18" name="Textfeld 17"/>
-          <p:cNvSpPr txBox="1"/>
-          <p:nvPr/>
-        </p:nvSpPr>
-        <p:spPr>
-          <a:xfrm>
-            <a:off x="9829580" y="974463"/>
-            <a:ext cx="1093569" cy="646331"/>
-          </a:xfrm>
-          <a:prstGeom prst="rect">
-            <a:avLst/>
-          </a:prstGeom>
-          <a:noFill/>
-        </p:spPr>
-        <p:txBody>
-          <a:bodyPr wrap="none" rtlCol="0">
-            <a:spAutoFit/>
-          </a:bodyPr>
-          <a:lstStyle/>
-          <a:p>
-            <a:r>
-              <a:rPr lang="en-US" dirty="0"/>
-              <a:t>r(e23) = </a:t>
-            </a:r>
-            <a:r>
-              <a:rPr lang="en-US" dirty="0" smtClean="0"/>
-              <a:t>2</a:t>
-            </a:r>
-          </a:p>
-          <a:p>
-            <a:pPr marL="0" lvl="1"/>
-            <a:r>
-              <a:rPr lang="en-US" dirty="0"/>
-              <a:t>r(e32) = </a:t>
-            </a:r>
-            <a:r>
-              <a:rPr lang="en-US" dirty="0" smtClean="0"/>
-              <a:t>4</a:t>
+              <a:rPr lang="en-US" smtClean="0"/>
+              <a:t>15</a:t>
             </a:r>
             <a:endParaRPr lang="en-US" dirty="0"/>
           </a:p>
@@ -4703,7 +4813,7 @@
     </p:spTree>
     <p:extLst>
       <p:ext uri="{BB962C8B-B14F-4D97-AF65-F5344CB8AC3E}">
-        <p14:creationId xmlns:p14="http://schemas.microsoft.com/office/powerpoint/2010/main" val="1795859511"/>
+        <p14:creationId xmlns:p14="http://schemas.microsoft.com/office/powerpoint/2010/main" val="1165908594"/>
       </p:ext>
     </p:extLst>
   </p:cSld>
@@ -4758,7 +4868,7 @@
             </a:r>
             <a:r>
               <a:rPr lang="en-US" dirty="0" smtClean="0"/>
-              <a:t> E1a</a:t>
+              <a:t> E1</a:t>
             </a:r>
             <a:endParaRPr lang="en-US" dirty="0"/>
           </a:p>
@@ -4776,104 +4886,62 @@
         </p:nvSpPr>
         <p:spPr/>
         <p:txBody>
-          <a:bodyPr>
-            <a:normAutofit fontScale="92500" lnSpcReduction="10000"/>
-          </a:bodyPr>
+          <a:bodyPr/>
           <a:lstStyle/>
           <a:p>
             <a:r>
-              <a:rPr lang="en-US" dirty="0" smtClean="0"/>
-              <a:t>This is a test for a topology that is modified by context events</a:t>
-            </a:r>
-          </a:p>
-          <a:p>
-            <a:r>
-              <a:rPr lang="en-US" dirty="0" smtClean="0"/>
-              <a:t>Initially: (k=1.5)</a:t>
+              <a:rPr lang="en-US" smtClean="0"/>
+              <a:t>Simple test case for e-ktc</a:t>
+            </a:r>
+          </a:p>
+          <a:p>
+            <a:r>
+              <a:rPr lang="en-US" smtClean="0"/>
+              <a:t>Cases (k=1.5)</a:t>
             </a:r>
           </a:p>
           <a:p>
             <a:pPr lvl="1"/>
             <a:r>
-              <a:rPr lang="en-US" dirty="0" smtClean="0"/>
-              <a:t>Only e13 inactive</a:t>
-            </a:r>
-          </a:p>
-          <a:p>
-            <a:r>
-              <a:rPr lang="en-US" dirty="0" smtClean="0"/>
-              <a:t>Context event: </a:t>
+              <a:rPr lang="en-US" smtClean="0"/>
+              <a:t>e13-e12-e23 =&gt; I</a:t>
             </a:r>
           </a:p>
           <a:p>
             <a:pPr lvl="1"/>
             <a:r>
-              <a:rPr lang="en-US" dirty="0"/>
-              <a:t>w</a:t>
-            </a:r>
-            <a:r>
-              <a:rPr lang="en-US" dirty="0" smtClean="0"/>
-              <a:t>(n3) := 15 -&gt; r(31) = 1.5, r(32) = 1</a:t>
-            </a:r>
-          </a:p>
-          <a:p>
-            <a:r>
-              <a:rPr lang="en-US" dirty="0" smtClean="0"/>
-              <a:t>Final state:</a:t>
+              <a:rPr lang="en-US" smtClean="0"/>
+              <a:t>e32-e21-e13 =&gt; A</a:t>
             </a:r>
           </a:p>
           <a:p>
             <a:pPr lvl="1"/>
             <a:r>
-              <a:rPr lang="en-US" dirty="0" smtClean="0"/>
-              <a:t>e13 I</a:t>
+              <a:rPr lang="en-US" smtClean="0"/>
+              <a:t>e21-e23-e31 =&gt; A</a:t>
             </a:r>
           </a:p>
           <a:p>
             <a:pPr lvl="1"/>
             <a:r>
-              <a:rPr lang="en-US" dirty="0" smtClean="0"/>
-              <a:t>e32 I</a:t>
+              <a:rPr lang="en-US" smtClean="0"/>
+              <a:t>e31-e32-e21 =&gt; A</a:t>
             </a:r>
           </a:p>
           <a:p>
             <a:pPr lvl="1"/>
             <a:r>
-              <a:rPr lang="en-US" dirty="0" smtClean="0"/>
-              <a:t>e21 A</a:t>
+              <a:rPr lang="en-US" smtClean="0"/>
+              <a:t>e12-e13-e32 =&gt; A</a:t>
             </a:r>
           </a:p>
           <a:p>
             <a:pPr lvl="1"/>
             <a:r>
-              <a:rPr lang="en-US" dirty="0" smtClean="0"/>
-              <a:t>e31 A</a:t>
-            </a:r>
-          </a:p>
-          <a:p>
-            <a:pPr lvl="1"/>
-            <a:r>
-              <a:rPr lang="en-US" dirty="0" smtClean="0"/>
-              <a:t>e12 A</a:t>
-            </a:r>
-          </a:p>
-          <a:p>
-            <a:pPr lvl="1"/>
-            <a:r>
-              <a:rPr lang="en-US" dirty="0" smtClean="0"/>
-              <a:t>e23 A</a:t>
-            </a:r>
-          </a:p>
-          <a:p>
-            <a:pPr lvl="1"/>
+              <a:rPr lang="en-US" smtClean="0"/>
+              <a:t>e23-e21-e13 =&gt; A</a:t>
+            </a:r>
             <a:endParaRPr lang="en-US" dirty="0" smtClean="0"/>
-          </a:p>
-          <a:p>
-            <a:pPr lvl="1"/>
-            <a:endParaRPr lang="en-US" dirty="0" smtClean="0"/>
-          </a:p>
-          <a:p>
-            <a:endParaRPr lang="en-US" dirty="0"/>
           </a:p>
         </p:txBody>
       </p:sp>
@@ -5139,8 +5207,8 @@
         </p:nvSpPr>
         <p:spPr>
           <a:xfrm>
-            <a:off x="7330453" y="1551899"/>
-            <a:ext cx="538930" cy="369332"/>
+            <a:off x="7543860" y="1390910"/>
+            <a:ext cx="301686" cy="369332"/>
           </a:xfrm>
           <a:prstGeom prst="rect">
             <a:avLst/>
@@ -5155,7 +5223,7 @@
           <a:p>
             <a:r>
               <a:rPr lang="en-US" dirty="0" smtClean="0"/>
-              <a:t>p=5</a:t>
+              <a:t>5</a:t>
             </a:r>
             <a:endParaRPr lang="en-US" dirty="0"/>
           </a:p>
@@ -5170,7 +5238,7 @@
         <p:spPr>
           <a:xfrm>
             <a:off x="9355214" y="1342806"/>
-            <a:ext cx="655949" cy="369332"/>
+            <a:ext cx="418704" cy="369332"/>
           </a:xfrm>
           <a:prstGeom prst="rect">
             <a:avLst/>
@@ -5184,8 +5252,12 @@
           <a:lstStyle/>
           <a:p>
             <a:r>
+              <a:rPr lang="en-US" dirty="0"/>
+              <a:t>1</a:t>
+            </a:r>
+            <a:r>
               <a:rPr lang="en-US" dirty="0" smtClean="0"/>
-              <a:t>p=15</a:t>
+              <a:t>5</a:t>
             </a:r>
             <a:endParaRPr lang="en-US" dirty="0"/>
           </a:p>
@@ -5200,7 +5272,7 @@
         <p:spPr>
           <a:xfrm>
             <a:off x="8681033" y="2335981"/>
-            <a:ext cx="655949" cy="369332"/>
+            <a:ext cx="418704" cy="369332"/>
           </a:xfrm>
           <a:prstGeom prst="rect">
             <a:avLst/>
@@ -5215,7 +5287,7 @@
           <a:p>
             <a:r>
               <a:rPr lang="en-US" dirty="0" smtClean="0"/>
-              <a:t>p=10</a:t>
+              <a:t>10</a:t>
             </a:r>
             <a:endParaRPr lang="en-US" dirty="0"/>
           </a:p>
@@ -5443,614 +5515,10 @@
           </a:p>
         </p:txBody>
       </p:sp>
-      <p:sp>
-        <p:nvSpPr>
-          <p:cNvPr id="19" name="Ellipse 18"/>
-          <p:cNvSpPr/>
-          <p:nvPr/>
-        </p:nvSpPr>
-        <p:spPr>
-          <a:xfrm>
-            <a:off x="7216362" y="5551996"/>
-            <a:ext cx="328474" cy="328474"/>
-          </a:xfrm>
-          <a:prstGeom prst="ellipse">
-            <a:avLst/>
-          </a:prstGeom>
-          <a:solidFill>
-            <a:schemeClr val="tx1"/>
-          </a:solidFill>
-        </p:spPr>
-        <p:style>
-          <a:lnRef idx="2">
-            <a:schemeClr val="accent1">
-              <a:shade val="50000"/>
-            </a:schemeClr>
-          </a:lnRef>
-          <a:fillRef idx="1">
-            <a:schemeClr val="accent1"/>
-          </a:fillRef>
-          <a:effectRef idx="0">
-            <a:schemeClr val="accent1"/>
-          </a:effectRef>
-          <a:fontRef idx="minor">
-            <a:schemeClr val="lt1"/>
-          </a:fontRef>
-        </p:style>
-        <p:txBody>
-          <a:bodyPr rtlCol="0" anchor="ctr"/>
-          <a:lstStyle/>
-          <a:p>
-            <a:pPr algn="ctr"/>
-            <a:r>
-              <a:rPr lang="en-US" dirty="0" smtClean="0"/>
-              <a:t>1</a:t>
-            </a:r>
-            <a:endParaRPr lang="en-US" dirty="0"/>
-          </a:p>
-        </p:txBody>
-      </p:sp>
-      <p:sp>
-        <p:nvSpPr>
-          <p:cNvPr id="20" name="Ellipse 19"/>
-          <p:cNvSpPr/>
-          <p:nvPr/>
-        </p:nvSpPr>
-        <p:spPr>
-          <a:xfrm>
-            <a:off x="8146256" y="4253491"/>
-            <a:ext cx="328474" cy="328474"/>
-          </a:xfrm>
-          <a:prstGeom prst="ellipse">
-            <a:avLst/>
-          </a:prstGeom>
-          <a:solidFill>
-            <a:schemeClr val="tx1"/>
-          </a:solidFill>
-        </p:spPr>
-        <p:style>
-          <a:lnRef idx="2">
-            <a:schemeClr val="accent1">
-              <a:shade val="50000"/>
-            </a:schemeClr>
-          </a:lnRef>
-          <a:fillRef idx="1">
-            <a:schemeClr val="accent1"/>
-          </a:fillRef>
-          <a:effectRef idx="0">
-            <a:schemeClr val="accent1"/>
-          </a:effectRef>
-          <a:fontRef idx="minor">
-            <a:schemeClr val="lt1"/>
-          </a:fontRef>
-        </p:style>
-        <p:txBody>
-          <a:bodyPr rtlCol="0" anchor="ctr"/>
-          <a:lstStyle/>
-          <a:p>
-            <a:pPr algn="ctr"/>
-            <a:r>
-              <a:rPr lang="en-US" dirty="0"/>
-              <a:t>2</a:t>
-            </a:r>
-          </a:p>
-        </p:txBody>
-      </p:sp>
-      <p:sp>
-        <p:nvSpPr>
-          <p:cNvPr id="21" name="Ellipse 20"/>
-          <p:cNvSpPr/>
-          <p:nvPr/>
-        </p:nvSpPr>
-        <p:spPr>
-          <a:xfrm>
-            <a:off x="10064573" y="5600100"/>
-            <a:ext cx="328474" cy="328474"/>
-          </a:xfrm>
-          <a:prstGeom prst="ellipse">
-            <a:avLst/>
-          </a:prstGeom>
-          <a:solidFill>
-            <a:schemeClr val="tx1"/>
-          </a:solidFill>
-        </p:spPr>
-        <p:style>
-          <a:lnRef idx="2">
-            <a:schemeClr val="accent1">
-              <a:shade val="50000"/>
-            </a:schemeClr>
-          </a:lnRef>
-          <a:fillRef idx="1">
-            <a:schemeClr val="accent1"/>
-          </a:fillRef>
-          <a:effectRef idx="0">
-            <a:schemeClr val="accent1"/>
-          </a:effectRef>
-          <a:fontRef idx="minor">
-            <a:schemeClr val="lt1"/>
-          </a:fontRef>
-        </p:style>
-        <p:txBody>
-          <a:bodyPr rtlCol="0" anchor="ctr"/>
-          <a:lstStyle/>
-          <a:p>
-            <a:pPr algn="ctr"/>
-            <a:r>
-              <a:rPr lang="en-US" dirty="0" smtClean="0"/>
-              <a:t>3</a:t>
-            </a:r>
-            <a:endParaRPr lang="en-US" dirty="0"/>
-          </a:p>
-        </p:txBody>
-      </p:sp>
-      <p:cxnSp>
-        <p:nvCxnSpPr>
-          <p:cNvPr id="22" name="Gerader Verbinder 21"/>
-          <p:cNvCxnSpPr>
-            <a:stCxn id="19" idx="7"/>
-            <a:endCxn id="20" idx="3"/>
-          </p:cNvCxnSpPr>
-          <p:nvPr/>
-        </p:nvCxnSpPr>
-        <p:spPr>
-          <a:xfrm flipV="1">
-            <a:off x="7496732" y="4533861"/>
-            <a:ext cx="697628" cy="1066239"/>
-          </a:xfrm>
-          <a:prstGeom prst="line">
-            <a:avLst/>
-          </a:prstGeom>
-          <a:ln w="38100">
-            <a:solidFill>
-              <a:schemeClr val="tx1"/>
-            </a:solidFill>
-          </a:ln>
-        </p:spPr>
-        <p:style>
-          <a:lnRef idx="1">
-            <a:schemeClr val="accent1"/>
-          </a:lnRef>
-          <a:fillRef idx="0">
-            <a:schemeClr val="accent1"/>
-          </a:fillRef>
-          <a:effectRef idx="0">
-            <a:schemeClr val="accent1"/>
-          </a:effectRef>
-          <a:fontRef idx="minor">
-            <a:schemeClr val="tx1"/>
-          </a:fontRef>
-        </p:style>
-      </p:cxnSp>
-      <p:cxnSp>
-        <p:nvCxnSpPr>
-          <p:cNvPr id="23" name="Gerader Verbinder 22"/>
-          <p:cNvCxnSpPr>
-            <a:stCxn id="21" idx="1"/>
-            <a:endCxn id="20" idx="5"/>
-          </p:cNvCxnSpPr>
-          <p:nvPr/>
-        </p:nvCxnSpPr>
-        <p:spPr>
-          <a:xfrm flipH="1" flipV="1">
-            <a:off x="8426626" y="4533861"/>
-            <a:ext cx="1686051" cy="1114343"/>
-          </a:xfrm>
-          <a:prstGeom prst="line">
-            <a:avLst/>
-          </a:prstGeom>
-          <a:ln w="38100">
-            <a:solidFill>
-              <a:schemeClr val="tx1"/>
-            </a:solidFill>
-          </a:ln>
-        </p:spPr>
-        <p:style>
-          <a:lnRef idx="1">
-            <a:schemeClr val="accent1"/>
-          </a:lnRef>
-          <a:fillRef idx="0">
-            <a:schemeClr val="accent1"/>
-          </a:fillRef>
-          <a:effectRef idx="0">
-            <a:schemeClr val="accent1"/>
-          </a:effectRef>
-          <a:fontRef idx="minor">
-            <a:schemeClr val="tx1"/>
-          </a:fontRef>
-        </p:style>
-      </p:cxnSp>
-      <p:cxnSp>
-        <p:nvCxnSpPr>
-          <p:cNvPr id="24" name="Gerader Verbinder 23"/>
-          <p:cNvCxnSpPr>
-            <a:stCxn id="21" idx="2"/>
-            <a:endCxn id="19" idx="6"/>
-          </p:cNvCxnSpPr>
-          <p:nvPr/>
-        </p:nvCxnSpPr>
-        <p:spPr>
-          <a:xfrm flipH="1" flipV="1">
-            <a:off x="7544836" y="5716233"/>
-            <a:ext cx="2519737" cy="48104"/>
-          </a:xfrm>
-          <a:prstGeom prst="line">
-            <a:avLst/>
-          </a:prstGeom>
-          <a:ln w="38100">
-            <a:solidFill>
-              <a:schemeClr val="tx1"/>
-            </a:solidFill>
-          </a:ln>
-        </p:spPr>
-        <p:style>
-          <a:lnRef idx="1">
-            <a:schemeClr val="accent1"/>
-          </a:lnRef>
-          <a:fillRef idx="0">
-            <a:schemeClr val="accent1"/>
-          </a:fillRef>
-          <a:effectRef idx="0">
-            <a:schemeClr val="accent1"/>
-          </a:effectRef>
-          <a:fontRef idx="minor">
-            <a:schemeClr val="tx1"/>
-          </a:fontRef>
-        </p:style>
-      </p:cxnSp>
-      <p:sp>
-        <p:nvSpPr>
-          <p:cNvPr id="25" name="Textfeld 24"/>
-          <p:cNvSpPr txBox="1"/>
-          <p:nvPr/>
-        </p:nvSpPr>
-        <p:spPr>
-          <a:xfrm>
-            <a:off x="7316698" y="4841586"/>
-            <a:ext cx="538930" cy="369332"/>
-          </a:xfrm>
-          <a:prstGeom prst="rect">
-            <a:avLst/>
-          </a:prstGeom>
-          <a:noFill/>
-        </p:spPr>
-        <p:txBody>
-          <a:bodyPr wrap="none" rtlCol="0">
-            <a:spAutoFit/>
-          </a:bodyPr>
-          <a:lstStyle/>
-          <a:p>
-            <a:r>
-              <a:rPr lang="en-US" dirty="0" smtClean="0"/>
-              <a:t>p=5</a:t>
-            </a:r>
-            <a:endParaRPr lang="en-US" dirty="0"/>
-          </a:p>
-        </p:txBody>
-      </p:sp>
-      <p:sp>
-        <p:nvSpPr>
-          <p:cNvPr id="26" name="Textfeld 25"/>
-          <p:cNvSpPr txBox="1"/>
-          <p:nvPr/>
-        </p:nvSpPr>
-        <p:spPr>
-          <a:xfrm>
-            <a:off x="9269651" y="4750733"/>
-            <a:ext cx="655949" cy="369332"/>
-          </a:xfrm>
-          <a:prstGeom prst="rect">
-            <a:avLst/>
-          </a:prstGeom>
-          <a:noFill/>
-        </p:spPr>
-        <p:txBody>
-          <a:bodyPr wrap="none" rtlCol="0">
-            <a:spAutoFit/>
-          </a:bodyPr>
-          <a:lstStyle/>
-          <a:p>
-            <a:r>
-              <a:rPr lang="en-US" dirty="0" smtClean="0"/>
-              <a:t>p=15</a:t>
-            </a:r>
-            <a:endParaRPr lang="en-US" dirty="0"/>
-          </a:p>
-        </p:txBody>
-      </p:sp>
-      <p:sp>
-        <p:nvSpPr>
-          <p:cNvPr id="27" name="Textfeld 26"/>
-          <p:cNvSpPr txBox="1"/>
-          <p:nvPr/>
-        </p:nvSpPr>
-        <p:spPr>
-          <a:xfrm>
-            <a:off x="8595470" y="5743908"/>
-            <a:ext cx="655949" cy="369332"/>
-          </a:xfrm>
-          <a:prstGeom prst="rect">
-            <a:avLst/>
-          </a:prstGeom>
-          <a:noFill/>
-        </p:spPr>
-        <p:txBody>
-          <a:bodyPr wrap="none" rtlCol="0">
-            <a:spAutoFit/>
-          </a:bodyPr>
-          <a:lstStyle/>
-          <a:p>
-            <a:r>
-              <a:rPr lang="en-US" dirty="0" smtClean="0"/>
-              <a:t>p=10</a:t>
-            </a:r>
-            <a:endParaRPr lang="en-US" dirty="0"/>
-          </a:p>
-        </p:txBody>
-      </p:sp>
-      <p:sp>
-        <p:nvSpPr>
-          <p:cNvPr id="28" name="Textfeld 27"/>
-          <p:cNvSpPr txBox="1"/>
-          <p:nvPr/>
-        </p:nvSpPr>
-        <p:spPr>
-          <a:xfrm>
-            <a:off x="6870878" y="5877188"/>
-            <a:ext cx="699230" cy="369332"/>
-          </a:xfrm>
-          <a:prstGeom prst="rect">
-            <a:avLst/>
-          </a:prstGeom>
-          <a:noFill/>
-        </p:spPr>
-        <p:txBody>
-          <a:bodyPr wrap="none" rtlCol="0">
-            <a:spAutoFit/>
-          </a:bodyPr>
-          <a:lstStyle/>
-          <a:p>
-            <a:r>
-              <a:rPr lang="en-US" dirty="0" smtClean="0"/>
-              <a:t>w=10</a:t>
-            </a:r>
-            <a:endParaRPr lang="en-US" dirty="0"/>
-          </a:p>
-        </p:txBody>
-      </p:sp>
-      <p:sp>
-        <p:nvSpPr>
-          <p:cNvPr id="29" name="Textfeld 28"/>
-          <p:cNvSpPr txBox="1"/>
-          <p:nvPr/>
-        </p:nvSpPr>
-        <p:spPr>
-          <a:xfrm>
-            <a:off x="7960878" y="3847710"/>
-            <a:ext cx="699230" cy="369332"/>
-          </a:xfrm>
-          <a:prstGeom prst="rect">
-            <a:avLst/>
-          </a:prstGeom>
-          <a:noFill/>
-        </p:spPr>
-        <p:txBody>
-          <a:bodyPr wrap="none" rtlCol="0">
-            <a:spAutoFit/>
-          </a:bodyPr>
-          <a:lstStyle/>
-          <a:p>
-            <a:r>
-              <a:rPr lang="en-US" dirty="0" smtClean="0"/>
-              <a:t>w=30</a:t>
-            </a:r>
-            <a:endParaRPr lang="en-US" dirty="0"/>
-          </a:p>
-        </p:txBody>
-      </p:sp>
-      <p:sp>
-        <p:nvSpPr>
-          <p:cNvPr id="30" name="Textfeld 29"/>
-          <p:cNvSpPr txBox="1"/>
-          <p:nvPr/>
-        </p:nvSpPr>
-        <p:spPr>
-          <a:xfrm>
-            <a:off x="10300891" y="5648204"/>
-            <a:ext cx="699230" cy="369332"/>
-          </a:xfrm>
-          <a:prstGeom prst="rect">
-            <a:avLst/>
-          </a:prstGeom>
-          <a:noFill/>
-        </p:spPr>
-        <p:txBody>
-          <a:bodyPr wrap="none" rtlCol="0">
-            <a:spAutoFit/>
-          </a:bodyPr>
-          <a:lstStyle/>
-          <a:p>
-            <a:r>
-              <a:rPr lang="en-US" dirty="0" smtClean="0"/>
-              <a:t>w=15</a:t>
-            </a:r>
-            <a:endParaRPr lang="en-US" dirty="0"/>
-          </a:p>
-        </p:txBody>
-      </p:sp>
-      <p:sp>
-        <p:nvSpPr>
-          <p:cNvPr id="31" name="Textfeld 30"/>
-          <p:cNvSpPr txBox="1"/>
-          <p:nvPr/>
-        </p:nvSpPr>
-        <p:spPr>
-          <a:xfrm>
-            <a:off x="6383945" y="4360530"/>
-            <a:ext cx="1093569" cy="646331"/>
-          </a:xfrm>
-          <a:prstGeom prst="rect">
-            <a:avLst/>
-          </a:prstGeom>
-          <a:noFill/>
-        </p:spPr>
-        <p:txBody>
-          <a:bodyPr wrap="none" rtlCol="0">
-            <a:spAutoFit/>
-          </a:bodyPr>
-          <a:lstStyle/>
-          <a:p>
-            <a:r>
-              <a:rPr lang="en-US" dirty="0"/>
-              <a:t>r(e12) = 2</a:t>
-            </a:r>
-            <a:endParaRPr lang="en-US" dirty="0" smtClean="0"/>
-          </a:p>
-          <a:p>
-            <a:pPr marL="0" lvl="1"/>
-            <a:r>
-              <a:rPr lang="en-US" dirty="0"/>
-              <a:t>r(e21) = </a:t>
-            </a:r>
-            <a:r>
-              <a:rPr lang="en-US" dirty="0" smtClean="0"/>
-              <a:t>6</a:t>
-            </a:r>
-            <a:endParaRPr lang="en-US" dirty="0"/>
-          </a:p>
-        </p:txBody>
-      </p:sp>
-      <p:sp>
-        <p:nvSpPr>
-          <p:cNvPr id="32" name="Textfeld 31"/>
-          <p:cNvSpPr txBox="1"/>
-          <p:nvPr/>
-        </p:nvSpPr>
-        <p:spPr>
-          <a:xfrm>
-            <a:off x="8257919" y="6061854"/>
-            <a:ext cx="1268296" cy="646331"/>
-          </a:xfrm>
-          <a:prstGeom prst="rect">
-            <a:avLst/>
-          </a:prstGeom>
-          <a:noFill/>
-        </p:spPr>
-        <p:txBody>
-          <a:bodyPr wrap="none" rtlCol="0">
-            <a:spAutoFit/>
-          </a:bodyPr>
-          <a:lstStyle/>
-          <a:p>
-            <a:r>
-              <a:rPr lang="en-US" b="1" dirty="0"/>
-              <a:t>r(e13) = </a:t>
-            </a:r>
-            <a:r>
-              <a:rPr lang="en-US" b="1" dirty="0" smtClean="0"/>
-              <a:t>1</a:t>
-            </a:r>
-          </a:p>
-          <a:p>
-            <a:pPr marL="0" lvl="1"/>
-            <a:r>
-              <a:rPr lang="en-US" b="1" dirty="0"/>
-              <a:t>r(e31) = </a:t>
-            </a:r>
-            <a:r>
-              <a:rPr lang="en-US" b="1" dirty="0" smtClean="0"/>
-              <a:t>1.5</a:t>
-            </a:r>
-            <a:endParaRPr lang="en-US" b="1" dirty="0"/>
-          </a:p>
-        </p:txBody>
-      </p:sp>
-      <p:sp>
-        <p:nvSpPr>
-          <p:cNvPr id="33" name="Textfeld 32"/>
-          <p:cNvSpPr txBox="1"/>
-          <p:nvPr/>
-        </p:nvSpPr>
-        <p:spPr>
-          <a:xfrm>
-            <a:off x="9744017" y="4382390"/>
-            <a:ext cx="1093569" cy="646331"/>
-          </a:xfrm>
-          <a:prstGeom prst="rect">
-            <a:avLst/>
-          </a:prstGeom>
-          <a:noFill/>
-        </p:spPr>
-        <p:txBody>
-          <a:bodyPr wrap="none" rtlCol="0">
-            <a:spAutoFit/>
-          </a:bodyPr>
-          <a:lstStyle/>
-          <a:p>
-            <a:r>
-              <a:rPr lang="en-US" dirty="0"/>
-              <a:t>r(e23) = </a:t>
-            </a:r>
-            <a:r>
-              <a:rPr lang="en-US" dirty="0" smtClean="0"/>
-              <a:t>2</a:t>
-            </a:r>
-          </a:p>
-          <a:p>
-            <a:pPr marL="0" lvl="1"/>
-            <a:r>
-              <a:rPr lang="en-US" b="1" dirty="0"/>
-              <a:t>r(e32) = 1</a:t>
-            </a:r>
-          </a:p>
-        </p:txBody>
-      </p:sp>
-      <p:sp>
-        <p:nvSpPr>
-          <p:cNvPr id="34" name="Pfeil nach unten 33"/>
-          <p:cNvSpPr/>
-          <p:nvPr/>
-        </p:nvSpPr>
-        <p:spPr>
-          <a:xfrm>
-            <a:off x="8535261" y="3299070"/>
-            <a:ext cx="574112" cy="639846"/>
-          </a:xfrm>
-          <a:prstGeom prst="downArrow">
-            <a:avLst/>
-          </a:prstGeom>
-          <a:solidFill>
-            <a:srgbClr val="0070C0"/>
-          </a:solidFill>
-        </p:spPr>
-        <p:style>
-          <a:lnRef idx="2">
-            <a:schemeClr val="accent1">
-              <a:shade val="50000"/>
-            </a:schemeClr>
-          </a:lnRef>
-          <a:fillRef idx="1">
-            <a:schemeClr val="accent1"/>
-          </a:fillRef>
-          <a:effectRef idx="0">
-            <a:schemeClr val="accent1"/>
-          </a:effectRef>
-          <a:fontRef idx="minor">
-            <a:schemeClr val="lt1"/>
-          </a:fontRef>
-        </p:style>
-        <p:txBody>
-          <a:bodyPr rtlCol="0" anchor="ctr"/>
-          <a:lstStyle/>
-          <a:p>
-            <a:pPr algn="ctr"/>
-            <a:endParaRPr lang="en-US"/>
-          </a:p>
-        </p:txBody>
-      </p:sp>
     </p:spTree>
     <p:extLst>
       <p:ext uri="{BB962C8B-B14F-4D97-AF65-F5344CB8AC3E}">
-        <p14:creationId xmlns:p14="http://schemas.microsoft.com/office/powerpoint/2010/main" val="1641011994"/>
+        <p14:creationId xmlns:p14="http://schemas.microsoft.com/office/powerpoint/2010/main" val="1795859511"/>
       </p:ext>
     </p:extLst>
   </p:cSld>
@@ -6100,16 +5568,12 @@
           <a:lstStyle/>
           <a:p>
             <a:r>
-              <a:rPr lang="en-US" dirty="0" err="1"/>
+              <a:rPr lang="en-US" dirty="0" err="1" smtClean="0"/>
               <a:t>Testgraph</a:t>
             </a:r>
             <a:r>
-              <a:rPr lang="en-US" dirty="0"/>
-              <a:t> </a:t>
-            </a:r>
-            <a:r>
               <a:rPr lang="en-US" dirty="0" smtClean="0"/>
-              <a:t>E2</a:t>
+              <a:t> E1a</a:t>
             </a:r>
             <a:endParaRPr lang="en-US" dirty="0"/>
           </a:p>
@@ -6127,19 +5591,103 @@
         </p:nvSpPr>
         <p:spPr/>
         <p:txBody>
-          <a:bodyPr/>
+          <a:bodyPr>
+            <a:normAutofit fontScale="92500" lnSpcReduction="10000"/>
+          </a:bodyPr>
           <a:lstStyle/>
           <a:p>
             <a:r>
-              <a:rPr lang="en-US" smtClean="0"/>
-              <a:t>k=1.1</a:t>
-            </a:r>
-          </a:p>
-          <a:p>
-            <a:r>
               <a:rPr lang="en-US" dirty="0" smtClean="0"/>
-              <a:t>This test case illustrates a situation where two links in a triangle have the same estimated remaining lifetime (e12 and e13)</a:t>
-            </a:r>
+              <a:t>This is a test for a topology that is modified by context events</a:t>
+            </a:r>
+          </a:p>
+          <a:p>
+            <a:r>
+              <a:rPr lang="en-US" dirty="0" smtClean="0"/>
+              <a:t>Initially: (k=1.5)</a:t>
+            </a:r>
+          </a:p>
+          <a:p>
+            <a:pPr lvl="1"/>
+            <a:r>
+              <a:rPr lang="en-US" dirty="0" smtClean="0"/>
+              <a:t>Only e13 inactive</a:t>
+            </a:r>
+          </a:p>
+          <a:p>
+            <a:r>
+              <a:rPr lang="en-US" dirty="0" smtClean="0"/>
+              <a:t>Context event: </a:t>
+            </a:r>
+          </a:p>
+          <a:p>
+            <a:pPr lvl="1"/>
+            <a:r>
+              <a:rPr lang="en-US" dirty="0"/>
+              <a:t>w</a:t>
+            </a:r>
+            <a:r>
+              <a:rPr lang="en-US" dirty="0" smtClean="0"/>
+              <a:t>(n3) := 15 -&gt; r(31) = 1.5, r(32) = 1</a:t>
+            </a:r>
+          </a:p>
+          <a:p>
+            <a:r>
+              <a:rPr lang="en-US" dirty="0" smtClean="0"/>
+              <a:t>Final state:</a:t>
+            </a:r>
+          </a:p>
+          <a:p>
+            <a:pPr lvl="1"/>
+            <a:r>
+              <a:rPr lang="en-US" dirty="0" smtClean="0"/>
+              <a:t>e13 I</a:t>
+            </a:r>
+          </a:p>
+          <a:p>
+            <a:pPr lvl="1"/>
+            <a:r>
+              <a:rPr lang="en-US" dirty="0" smtClean="0"/>
+              <a:t>e32 I</a:t>
+            </a:r>
+          </a:p>
+          <a:p>
+            <a:pPr lvl="1"/>
+            <a:r>
+              <a:rPr lang="en-US" dirty="0" smtClean="0"/>
+              <a:t>e21 A</a:t>
+            </a:r>
+          </a:p>
+          <a:p>
+            <a:pPr lvl="1"/>
+            <a:r>
+              <a:rPr lang="en-US" dirty="0" smtClean="0"/>
+              <a:t>e31 A</a:t>
+            </a:r>
+          </a:p>
+          <a:p>
+            <a:pPr lvl="1"/>
+            <a:r>
+              <a:rPr lang="en-US" dirty="0" smtClean="0"/>
+              <a:t>e12 A</a:t>
+            </a:r>
+          </a:p>
+          <a:p>
+            <a:pPr lvl="1"/>
+            <a:r>
+              <a:rPr lang="en-US" dirty="0" smtClean="0"/>
+              <a:t>e23 A</a:t>
+            </a:r>
+          </a:p>
+          <a:p>
+            <a:pPr lvl="1"/>
+            <a:endParaRPr lang="en-US" dirty="0" smtClean="0"/>
+          </a:p>
+          <a:p>
+            <a:pPr lvl="1"/>
+            <a:endParaRPr lang="en-US" dirty="0" smtClean="0"/>
+          </a:p>
+          <a:p>
             <a:endParaRPr lang="en-US" dirty="0"/>
           </a:p>
         </p:txBody>
@@ -6406,6 +5954,1273 @@
         </p:nvSpPr>
         <p:spPr>
           <a:xfrm>
+            <a:off x="7330453" y="1551899"/>
+            <a:ext cx="538930" cy="369332"/>
+          </a:xfrm>
+          <a:prstGeom prst="rect">
+            <a:avLst/>
+          </a:prstGeom>
+          <a:noFill/>
+        </p:spPr>
+        <p:txBody>
+          <a:bodyPr wrap="none" rtlCol="0">
+            <a:spAutoFit/>
+          </a:bodyPr>
+          <a:lstStyle/>
+          <a:p>
+            <a:r>
+              <a:rPr lang="en-US" dirty="0" smtClean="0"/>
+              <a:t>p=5</a:t>
+            </a:r>
+            <a:endParaRPr lang="en-US" dirty="0"/>
+          </a:p>
+        </p:txBody>
+      </p:sp>
+      <p:sp>
+        <p:nvSpPr>
+          <p:cNvPr id="11" name="Textfeld 10"/>
+          <p:cNvSpPr txBox="1"/>
+          <p:nvPr/>
+        </p:nvSpPr>
+        <p:spPr>
+          <a:xfrm>
+            <a:off x="9355214" y="1342806"/>
+            <a:ext cx="655949" cy="369332"/>
+          </a:xfrm>
+          <a:prstGeom prst="rect">
+            <a:avLst/>
+          </a:prstGeom>
+          <a:noFill/>
+        </p:spPr>
+        <p:txBody>
+          <a:bodyPr wrap="none" rtlCol="0">
+            <a:spAutoFit/>
+          </a:bodyPr>
+          <a:lstStyle/>
+          <a:p>
+            <a:r>
+              <a:rPr lang="en-US" dirty="0" smtClean="0"/>
+              <a:t>p=15</a:t>
+            </a:r>
+            <a:endParaRPr lang="en-US" dirty="0"/>
+          </a:p>
+        </p:txBody>
+      </p:sp>
+      <p:sp>
+        <p:nvSpPr>
+          <p:cNvPr id="12" name="Textfeld 11"/>
+          <p:cNvSpPr txBox="1"/>
+          <p:nvPr/>
+        </p:nvSpPr>
+        <p:spPr>
+          <a:xfrm>
+            <a:off x="8681033" y="2335981"/>
+            <a:ext cx="655949" cy="369332"/>
+          </a:xfrm>
+          <a:prstGeom prst="rect">
+            <a:avLst/>
+          </a:prstGeom>
+          <a:noFill/>
+        </p:spPr>
+        <p:txBody>
+          <a:bodyPr wrap="none" rtlCol="0">
+            <a:spAutoFit/>
+          </a:bodyPr>
+          <a:lstStyle/>
+          <a:p>
+            <a:r>
+              <a:rPr lang="en-US" dirty="0" smtClean="0"/>
+              <a:t>p=10</a:t>
+            </a:r>
+            <a:endParaRPr lang="en-US" dirty="0"/>
+          </a:p>
+        </p:txBody>
+      </p:sp>
+      <p:sp>
+        <p:nvSpPr>
+          <p:cNvPr id="13" name="Textfeld 12"/>
+          <p:cNvSpPr txBox="1"/>
+          <p:nvPr/>
+        </p:nvSpPr>
+        <p:spPr>
+          <a:xfrm>
+            <a:off x="6956441" y="2469261"/>
+            <a:ext cx="699230" cy="369332"/>
+          </a:xfrm>
+          <a:prstGeom prst="rect">
+            <a:avLst/>
+          </a:prstGeom>
+          <a:noFill/>
+        </p:spPr>
+        <p:txBody>
+          <a:bodyPr wrap="none" rtlCol="0">
+            <a:spAutoFit/>
+          </a:bodyPr>
+          <a:lstStyle/>
+          <a:p>
+            <a:r>
+              <a:rPr lang="en-US" dirty="0" smtClean="0"/>
+              <a:t>w=10</a:t>
+            </a:r>
+            <a:endParaRPr lang="en-US" dirty="0"/>
+          </a:p>
+        </p:txBody>
+      </p:sp>
+      <p:sp>
+        <p:nvSpPr>
+          <p:cNvPr id="14" name="Textfeld 13"/>
+          <p:cNvSpPr txBox="1"/>
+          <p:nvPr/>
+        </p:nvSpPr>
+        <p:spPr>
+          <a:xfrm>
+            <a:off x="8046441" y="439783"/>
+            <a:ext cx="699230" cy="369332"/>
+          </a:xfrm>
+          <a:prstGeom prst="rect">
+            <a:avLst/>
+          </a:prstGeom>
+          <a:noFill/>
+        </p:spPr>
+        <p:txBody>
+          <a:bodyPr wrap="none" rtlCol="0">
+            <a:spAutoFit/>
+          </a:bodyPr>
+          <a:lstStyle/>
+          <a:p>
+            <a:r>
+              <a:rPr lang="en-US" dirty="0" smtClean="0"/>
+              <a:t>w=30</a:t>
+            </a:r>
+            <a:endParaRPr lang="en-US" dirty="0"/>
+          </a:p>
+        </p:txBody>
+      </p:sp>
+      <p:sp>
+        <p:nvSpPr>
+          <p:cNvPr id="15" name="Textfeld 14"/>
+          <p:cNvSpPr txBox="1"/>
+          <p:nvPr/>
+        </p:nvSpPr>
+        <p:spPr>
+          <a:xfrm>
+            <a:off x="10386454" y="2240277"/>
+            <a:ext cx="699230" cy="369332"/>
+          </a:xfrm>
+          <a:prstGeom prst="rect">
+            <a:avLst/>
+          </a:prstGeom>
+          <a:noFill/>
+        </p:spPr>
+        <p:txBody>
+          <a:bodyPr wrap="none" rtlCol="0">
+            <a:spAutoFit/>
+          </a:bodyPr>
+          <a:lstStyle/>
+          <a:p>
+            <a:r>
+              <a:rPr lang="en-US" dirty="0" smtClean="0"/>
+              <a:t>w=60</a:t>
+            </a:r>
+            <a:endParaRPr lang="en-US" dirty="0"/>
+          </a:p>
+        </p:txBody>
+      </p:sp>
+      <p:sp>
+        <p:nvSpPr>
+          <p:cNvPr id="16" name="Textfeld 15"/>
+          <p:cNvSpPr txBox="1"/>
+          <p:nvPr/>
+        </p:nvSpPr>
+        <p:spPr>
+          <a:xfrm>
+            <a:off x="6469508" y="952603"/>
+            <a:ext cx="1093569" cy="646331"/>
+          </a:xfrm>
+          <a:prstGeom prst="rect">
+            <a:avLst/>
+          </a:prstGeom>
+          <a:noFill/>
+        </p:spPr>
+        <p:txBody>
+          <a:bodyPr wrap="none" rtlCol="0">
+            <a:spAutoFit/>
+          </a:bodyPr>
+          <a:lstStyle/>
+          <a:p>
+            <a:r>
+              <a:rPr lang="en-US" dirty="0"/>
+              <a:t>r(e12) = 2</a:t>
+            </a:r>
+            <a:endParaRPr lang="en-US" dirty="0" smtClean="0"/>
+          </a:p>
+          <a:p>
+            <a:pPr marL="0" lvl="1"/>
+            <a:r>
+              <a:rPr lang="en-US" dirty="0"/>
+              <a:t>r(e21) = </a:t>
+            </a:r>
+            <a:r>
+              <a:rPr lang="en-US" dirty="0" smtClean="0"/>
+              <a:t>6</a:t>
+            </a:r>
+            <a:endParaRPr lang="en-US" dirty="0"/>
+          </a:p>
+        </p:txBody>
+      </p:sp>
+      <p:sp>
+        <p:nvSpPr>
+          <p:cNvPr id="17" name="Textfeld 16"/>
+          <p:cNvSpPr txBox="1"/>
+          <p:nvPr/>
+        </p:nvSpPr>
+        <p:spPr>
+          <a:xfrm>
+            <a:off x="8343482" y="2653927"/>
+            <a:ext cx="1093569" cy="646331"/>
+          </a:xfrm>
+          <a:prstGeom prst="rect">
+            <a:avLst/>
+          </a:prstGeom>
+          <a:noFill/>
+        </p:spPr>
+        <p:txBody>
+          <a:bodyPr wrap="none" rtlCol="0">
+            <a:spAutoFit/>
+          </a:bodyPr>
+          <a:lstStyle/>
+          <a:p>
+            <a:r>
+              <a:rPr lang="en-US" dirty="0"/>
+              <a:t>r(e13) = </a:t>
+            </a:r>
+            <a:r>
+              <a:rPr lang="en-US" dirty="0" smtClean="0"/>
+              <a:t>1</a:t>
+            </a:r>
+          </a:p>
+          <a:p>
+            <a:pPr marL="0" lvl="1"/>
+            <a:r>
+              <a:rPr lang="en-US" dirty="0"/>
+              <a:t>r(e31) = </a:t>
+            </a:r>
+            <a:r>
+              <a:rPr lang="en-US" dirty="0" smtClean="0"/>
+              <a:t>6</a:t>
+            </a:r>
+            <a:endParaRPr lang="en-US" dirty="0"/>
+          </a:p>
+        </p:txBody>
+      </p:sp>
+      <p:sp>
+        <p:nvSpPr>
+          <p:cNvPr id="18" name="Textfeld 17"/>
+          <p:cNvSpPr txBox="1"/>
+          <p:nvPr/>
+        </p:nvSpPr>
+        <p:spPr>
+          <a:xfrm>
+            <a:off x="9829580" y="974463"/>
+            <a:ext cx="1093569" cy="646331"/>
+          </a:xfrm>
+          <a:prstGeom prst="rect">
+            <a:avLst/>
+          </a:prstGeom>
+          <a:noFill/>
+        </p:spPr>
+        <p:txBody>
+          <a:bodyPr wrap="none" rtlCol="0">
+            <a:spAutoFit/>
+          </a:bodyPr>
+          <a:lstStyle/>
+          <a:p>
+            <a:r>
+              <a:rPr lang="en-US" dirty="0"/>
+              <a:t>r(e23) = </a:t>
+            </a:r>
+            <a:r>
+              <a:rPr lang="en-US" dirty="0" smtClean="0"/>
+              <a:t>2</a:t>
+            </a:r>
+          </a:p>
+          <a:p>
+            <a:pPr marL="0" lvl="1"/>
+            <a:r>
+              <a:rPr lang="en-US" dirty="0"/>
+              <a:t>r(e32) = </a:t>
+            </a:r>
+            <a:r>
+              <a:rPr lang="en-US" dirty="0" smtClean="0"/>
+              <a:t>4</a:t>
+            </a:r>
+            <a:endParaRPr lang="en-US" dirty="0"/>
+          </a:p>
+        </p:txBody>
+      </p:sp>
+      <p:sp>
+        <p:nvSpPr>
+          <p:cNvPr id="19" name="Ellipse 18"/>
+          <p:cNvSpPr/>
+          <p:nvPr/>
+        </p:nvSpPr>
+        <p:spPr>
+          <a:xfrm>
+            <a:off x="7216362" y="5551996"/>
+            <a:ext cx="328474" cy="328474"/>
+          </a:xfrm>
+          <a:prstGeom prst="ellipse">
+            <a:avLst/>
+          </a:prstGeom>
+          <a:solidFill>
+            <a:schemeClr val="tx1"/>
+          </a:solidFill>
+        </p:spPr>
+        <p:style>
+          <a:lnRef idx="2">
+            <a:schemeClr val="accent1">
+              <a:shade val="50000"/>
+            </a:schemeClr>
+          </a:lnRef>
+          <a:fillRef idx="1">
+            <a:schemeClr val="accent1"/>
+          </a:fillRef>
+          <a:effectRef idx="0">
+            <a:schemeClr val="accent1"/>
+          </a:effectRef>
+          <a:fontRef idx="minor">
+            <a:schemeClr val="lt1"/>
+          </a:fontRef>
+        </p:style>
+        <p:txBody>
+          <a:bodyPr rtlCol="0" anchor="ctr"/>
+          <a:lstStyle/>
+          <a:p>
+            <a:pPr algn="ctr"/>
+            <a:r>
+              <a:rPr lang="en-US" dirty="0" smtClean="0"/>
+              <a:t>1</a:t>
+            </a:r>
+            <a:endParaRPr lang="en-US" dirty="0"/>
+          </a:p>
+        </p:txBody>
+      </p:sp>
+      <p:sp>
+        <p:nvSpPr>
+          <p:cNvPr id="20" name="Ellipse 19"/>
+          <p:cNvSpPr/>
+          <p:nvPr/>
+        </p:nvSpPr>
+        <p:spPr>
+          <a:xfrm>
+            <a:off x="8146256" y="4253491"/>
+            <a:ext cx="328474" cy="328474"/>
+          </a:xfrm>
+          <a:prstGeom prst="ellipse">
+            <a:avLst/>
+          </a:prstGeom>
+          <a:solidFill>
+            <a:schemeClr val="tx1"/>
+          </a:solidFill>
+        </p:spPr>
+        <p:style>
+          <a:lnRef idx="2">
+            <a:schemeClr val="accent1">
+              <a:shade val="50000"/>
+            </a:schemeClr>
+          </a:lnRef>
+          <a:fillRef idx="1">
+            <a:schemeClr val="accent1"/>
+          </a:fillRef>
+          <a:effectRef idx="0">
+            <a:schemeClr val="accent1"/>
+          </a:effectRef>
+          <a:fontRef idx="minor">
+            <a:schemeClr val="lt1"/>
+          </a:fontRef>
+        </p:style>
+        <p:txBody>
+          <a:bodyPr rtlCol="0" anchor="ctr"/>
+          <a:lstStyle/>
+          <a:p>
+            <a:pPr algn="ctr"/>
+            <a:r>
+              <a:rPr lang="en-US" dirty="0"/>
+              <a:t>2</a:t>
+            </a:r>
+          </a:p>
+        </p:txBody>
+      </p:sp>
+      <p:sp>
+        <p:nvSpPr>
+          <p:cNvPr id="21" name="Ellipse 20"/>
+          <p:cNvSpPr/>
+          <p:nvPr/>
+        </p:nvSpPr>
+        <p:spPr>
+          <a:xfrm>
+            <a:off x="10064573" y="5600100"/>
+            <a:ext cx="328474" cy="328474"/>
+          </a:xfrm>
+          <a:prstGeom prst="ellipse">
+            <a:avLst/>
+          </a:prstGeom>
+          <a:solidFill>
+            <a:schemeClr val="tx1"/>
+          </a:solidFill>
+        </p:spPr>
+        <p:style>
+          <a:lnRef idx="2">
+            <a:schemeClr val="accent1">
+              <a:shade val="50000"/>
+            </a:schemeClr>
+          </a:lnRef>
+          <a:fillRef idx="1">
+            <a:schemeClr val="accent1"/>
+          </a:fillRef>
+          <a:effectRef idx="0">
+            <a:schemeClr val="accent1"/>
+          </a:effectRef>
+          <a:fontRef idx="minor">
+            <a:schemeClr val="lt1"/>
+          </a:fontRef>
+        </p:style>
+        <p:txBody>
+          <a:bodyPr rtlCol="0" anchor="ctr"/>
+          <a:lstStyle/>
+          <a:p>
+            <a:pPr algn="ctr"/>
+            <a:r>
+              <a:rPr lang="en-US" dirty="0" smtClean="0"/>
+              <a:t>3</a:t>
+            </a:r>
+            <a:endParaRPr lang="en-US" dirty="0"/>
+          </a:p>
+        </p:txBody>
+      </p:sp>
+      <p:cxnSp>
+        <p:nvCxnSpPr>
+          <p:cNvPr id="22" name="Gerader Verbinder 21"/>
+          <p:cNvCxnSpPr>
+            <a:stCxn id="19" idx="7"/>
+            <a:endCxn id="20" idx="3"/>
+          </p:cNvCxnSpPr>
+          <p:nvPr/>
+        </p:nvCxnSpPr>
+        <p:spPr>
+          <a:xfrm flipV="1">
+            <a:off x="7496732" y="4533861"/>
+            <a:ext cx="697628" cy="1066239"/>
+          </a:xfrm>
+          <a:prstGeom prst="line">
+            <a:avLst/>
+          </a:prstGeom>
+          <a:ln w="38100">
+            <a:solidFill>
+              <a:schemeClr val="tx1"/>
+            </a:solidFill>
+          </a:ln>
+        </p:spPr>
+        <p:style>
+          <a:lnRef idx="1">
+            <a:schemeClr val="accent1"/>
+          </a:lnRef>
+          <a:fillRef idx="0">
+            <a:schemeClr val="accent1"/>
+          </a:fillRef>
+          <a:effectRef idx="0">
+            <a:schemeClr val="accent1"/>
+          </a:effectRef>
+          <a:fontRef idx="minor">
+            <a:schemeClr val="tx1"/>
+          </a:fontRef>
+        </p:style>
+      </p:cxnSp>
+      <p:cxnSp>
+        <p:nvCxnSpPr>
+          <p:cNvPr id="23" name="Gerader Verbinder 22"/>
+          <p:cNvCxnSpPr>
+            <a:stCxn id="21" idx="1"/>
+            <a:endCxn id="20" idx="5"/>
+          </p:cNvCxnSpPr>
+          <p:nvPr/>
+        </p:nvCxnSpPr>
+        <p:spPr>
+          <a:xfrm flipH="1" flipV="1">
+            <a:off x="8426626" y="4533861"/>
+            <a:ext cx="1686051" cy="1114343"/>
+          </a:xfrm>
+          <a:prstGeom prst="line">
+            <a:avLst/>
+          </a:prstGeom>
+          <a:ln w="38100">
+            <a:solidFill>
+              <a:schemeClr val="tx1"/>
+            </a:solidFill>
+          </a:ln>
+        </p:spPr>
+        <p:style>
+          <a:lnRef idx="1">
+            <a:schemeClr val="accent1"/>
+          </a:lnRef>
+          <a:fillRef idx="0">
+            <a:schemeClr val="accent1"/>
+          </a:fillRef>
+          <a:effectRef idx="0">
+            <a:schemeClr val="accent1"/>
+          </a:effectRef>
+          <a:fontRef idx="minor">
+            <a:schemeClr val="tx1"/>
+          </a:fontRef>
+        </p:style>
+      </p:cxnSp>
+      <p:cxnSp>
+        <p:nvCxnSpPr>
+          <p:cNvPr id="24" name="Gerader Verbinder 23"/>
+          <p:cNvCxnSpPr>
+            <a:stCxn id="21" idx="2"/>
+            <a:endCxn id="19" idx="6"/>
+          </p:cNvCxnSpPr>
+          <p:nvPr/>
+        </p:nvCxnSpPr>
+        <p:spPr>
+          <a:xfrm flipH="1" flipV="1">
+            <a:off x="7544836" y="5716233"/>
+            <a:ext cx="2519737" cy="48104"/>
+          </a:xfrm>
+          <a:prstGeom prst="line">
+            <a:avLst/>
+          </a:prstGeom>
+          <a:ln w="38100">
+            <a:solidFill>
+              <a:schemeClr val="tx1"/>
+            </a:solidFill>
+          </a:ln>
+        </p:spPr>
+        <p:style>
+          <a:lnRef idx="1">
+            <a:schemeClr val="accent1"/>
+          </a:lnRef>
+          <a:fillRef idx="0">
+            <a:schemeClr val="accent1"/>
+          </a:fillRef>
+          <a:effectRef idx="0">
+            <a:schemeClr val="accent1"/>
+          </a:effectRef>
+          <a:fontRef idx="minor">
+            <a:schemeClr val="tx1"/>
+          </a:fontRef>
+        </p:style>
+      </p:cxnSp>
+      <p:sp>
+        <p:nvSpPr>
+          <p:cNvPr id="25" name="Textfeld 24"/>
+          <p:cNvSpPr txBox="1"/>
+          <p:nvPr/>
+        </p:nvSpPr>
+        <p:spPr>
+          <a:xfrm>
+            <a:off x="7316698" y="4841586"/>
+            <a:ext cx="538930" cy="369332"/>
+          </a:xfrm>
+          <a:prstGeom prst="rect">
+            <a:avLst/>
+          </a:prstGeom>
+          <a:noFill/>
+        </p:spPr>
+        <p:txBody>
+          <a:bodyPr wrap="none" rtlCol="0">
+            <a:spAutoFit/>
+          </a:bodyPr>
+          <a:lstStyle/>
+          <a:p>
+            <a:r>
+              <a:rPr lang="en-US" dirty="0" smtClean="0"/>
+              <a:t>p=5</a:t>
+            </a:r>
+            <a:endParaRPr lang="en-US" dirty="0"/>
+          </a:p>
+        </p:txBody>
+      </p:sp>
+      <p:sp>
+        <p:nvSpPr>
+          <p:cNvPr id="26" name="Textfeld 25"/>
+          <p:cNvSpPr txBox="1"/>
+          <p:nvPr/>
+        </p:nvSpPr>
+        <p:spPr>
+          <a:xfrm>
+            <a:off x="9269651" y="4750733"/>
+            <a:ext cx="655949" cy="369332"/>
+          </a:xfrm>
+          <a:prstGeom prst="rect">
+            <a:avLst/>
+          </a:prstGeom>
+          <a:noFill/>
+        </p:spPr>
+        <p:txBody>
+          <a:bodyPr wrap="none" rtlCol="0">
+            <a:spAutoFit/>
+          </a:bodyPr>
+          <a:lstStyle/>
+          <a:p>
+            <a:r>
+              <a:rPr lang="en-US" dirty="0" smtClean="0"/>
+              <a:t>p=15</a:t>
+            </a:r>
+            <a:endParaRPr lang="en-US" dirty="0"/>
+          </a:p>
+        </p:txBody>
+      </p:sp>
+      <p:sp>
+        <p:nvSpPr>
+          <p:cNvPr id="27" name="Textfeld 26"/>
+          <p:cNvSpPr txBox="1"/>
+          <p:nvPr/>
+        </p:nvSpPr>
+        <p:spPr>
+          <a:xfrm>
+            <a:off x="8595470" y="5743908"/>
+            <a:ext cx="655949" cy="369332"/>
+          </a:xfrm>
+          <a:prstGeom prst="rect">
+            <a:avLst/>
+          </a:prstGeom>
+          <a:noFill/>
+        </p:spPr>
+        <p:txBody>
+          <a:bodyPr wrap="none" rtlCol="0">
+            <a:spAutoFit/>
+          </a:bodyPr>
+          <a:lstStyle/>
+          <a:p>
+            <a:r>
+              <a:rPr lang="en-US" dirty="0" smtClean="0"/>
+              <a:t>p=10</a:t>
+            </a:r>
+            <a:endParaRPr lang="en-US" dirty="0"/>
+          </a:p>
+        </p:txBody>
+      </p:sp>
+      <p:sp>
+        <p:nvSpPr>
+          <p:cNvPr id="28" name="Textfeld 27"/>
+          <p:cNvSpPr txBox="1"/>
+          <p:nvPr/>
+        </p:nvSpPr>
+        <p:spPr>
+          <a:xfrm>
+            <a:off x="6870878" y="5877188"/>
+            <a:ext cx="699230" cy="369332"/>
+          </a:xfrm>
+          <a:prstGeom prst="rect">
+            <a:avLst/>
+          </a:prstGeom>
+          <a:noFill/>
+        </p:spPr>
+        <p:txBody>
+          <a:bodyPr wrap="none" rtlCol="0">
+            <a:spAutoFit/>
+          </a:bodyPr>
+          <a:lstStyle/>
+          <a:p>
+            <a:r>
+              <a:rPr lang="en-US" dirty="0" smtClean="0"/>
+              <a:t>w=10</a:t>
+            </a:r>
+            <a:endParaRPr lang="en-US" dirty="0"/>
+          </a:p>
+        </p:txBody>
+      </p:sp>
+      <p:sp>
+        <p:nvSpPr>
+          <p:cNvPr id="29" name="Textfeld 28"/>
+          <p:cNvSpPr txBox="1"/>
+          <p:nvPr/>
+        </p:nvSpPr>
+        <p:spPr>
+          <a:xfrm>
+            <a:off x="7960878" y="3847710"/>
+            <a:ext cx="699230" cy="369332"/>
+          </a:xfrm>
+          <a:prstGeom prst="rect">
+            <a:avLst/>
+          </a:prstGeom>
+          <a:noFill/>
+        </p:spPr>
+        <p:txBody>
+          <a:bodyPr wrap="none" rtlCol="0">
+            <a:spAutoFit/>
+          </a:bodyPr>
+          <a:lstStyle/>
+          <a:p>
+            <a:r>
+              <a:rPr lang="en-US" dirty="0" smtClean="0"/>
+              <a:t>w=30</a:t>
+            </a:r>
+            <a:endParaRPr lang="en-US" dirty="0"/>
+          </a:p>
+        </p:txBody>
+      </p:sp>
+      <p:sp>
+        <p:nvSpPr>
+          <p:cNvPr id="30" name="Textfeld 29"/>
+          <p:cNvSpPr txBox="1"/>
+          <p:nvPr/>
+        </p:nvSpPr>
+        <p:spPr>
+          <a:xfrm>
+            <a:off x="10300891" y="5648204"/>
+            <a:ext cx="699230" cy="369332"/>
+          </a:xfrm>
+          <a:prstGeom prst="rect">
+            <a:avLst/>
+          </a:prstGeom>
+          <a:noFill/>
+        </p:spPr>
+        <p:txBody>
+          <a:bodyPr wrap="none" rtlCol="0">
+            <a:spAutoFit/>
+          </a:bodyPr>
+          <a:lstStyle/>
+          <a:p>
+            <a:r>
+              <a:rPr lang="en-US" dirty="0" smtClean="0"/>
+              <a:t>w=15</a:t>
+            </a:r>
+            <a:endParaRPr lang="en-US" dirty="0"/>
+          </a:p>
+        </p:txBody>
+      </p:sp>
+      <p:sp>
+        <p:nvSpPr>
+          <p:cNvPr id="31" name="Textfeld 30"/>
+          <p:cNvSpPr txBox="1"/>
+          <p:nvPr/>
+        </p:nvSpPr>
+        <p:spPr>
+          <a:xfrm>
+            <a:off x="6383945" y="4360530"/>
+            <a:ext cx="1093569" cy="646331"/>
+          </a:xfrm>
+          <a:prstGeom prst="rect">
+            <a:avLst/>
+          </a:prstGeom>
+          <a:noFill/>
+        </p:spPr>
+        <p:txBody>
+          <a:bodyPr wrap="none" rtlCol="0">
+            <a:spAutoFit/>
+          </a:bodyPr>
+          <a:lstStyle/>
+          <a:p>
+            <a:r>
+              <a:rPr lang="en-US" dirty="0"/>
+              <a:t>r(e12) = 2</a:t>
+            </a:r>
+            <a:endParaRPr lang="en-US" dirty="0" smtClean="0"/>
+          </a:p>
+          <a:p>
+            <a:pPr marL="0" lvl="1"/>
+            <a:r>
+              <a:rPr lang="en-US" dirty="0"/>
+              <a:t>r(e21) = </a:t>
+            </a:r>
+            <a:r>
+              <a:rPr lang="en-US" dirty="0" smtClean="0"/>
+              <a:t>6</a:t>
+            </a:r>
+            <a:endParaRPr lang="en-US" dirty="0"/>
+          </a:p>
+        </p:txBody>
+      </p:sp>
+      <p:sp>
+        <p:nvSpPr>
+          <p:cNvPr id="32" name="Textfeld 31"/>
+          <p:cNvSpPr txBox="1"/>
+          <p:nvPr/>
+        </p:nvSpPr>
+        <p:spPr>
+          <a:xfrm>
+            <a:off x="8257919" y="6061854"/>
+            <a:ext cx="1268296" cy="646331"/>
+          </a:xfrm>
+          <a:prstGeom prst="rect">
+            <a:avLst/>
+          </a:prstGeom>
+          <a:noFill/>
+        </p:spPr>
+        <p:txBody>
+          <a:bodyPr wrap="none" rtlCol="0">
+            <a:spAutoFit/>
+          </a:bodyPr>
+          <a:lstStyle/>
+          <a:p>
+            <a:r>
+              <a:rPr lang="en-US" b="1" dirty="0"/>
+              <a:t>r(e13) = </a:t>
+            </a:r>
+            <a:r>
+              <a:rPr lang="en-US" b="1" dirty="0" smtClean="0"/>
+              <a:t>1</a:t>
+            </a:r>
+          </a:p>
+          <a:p>
+            <a:pPr marL="0" lvl="1"/>
+            <a:r>
+              <a:rPr lang="en-US" b="1" dirty="0"/>
+              <a:t>r(e31) = </a:t>
+            </a:r>
+            <a:r>
+              <a:rPr lang="en-US" b="1" dirty="0" smtClean="0"/>
+              <a:t>1.5</a:t>
+            </a:r>
+            <a:endParaRPr lang="en-US" b="1" dirty="0"/>
+          </a:p>
+        </p:txBody>
+      </p:sp>
+      <p:sp>
+        <p:nvSpPr>
+          <p:cNvPr id="33" name="Textfeld 32"/>
+          <p:cNvSpPr txBox="1"/>
+          <p:nvPr/>
+        </p:nvSpPr>
+        <p:spPr>
+          <a:xfrm>
+            <a:off x="9744017" y="4382390"/>
+            <a:ext cx="1093569" cy="646331"/>
+          </a:xfrm>
+          <a:prstGeom prst="rect">
+            <a:avLst/>
+          </a:prstGeom>
+          <a:noFill/>
+        </p:spPr>
+        <p:txBody>
+          <a:bodyPr wrap="none" rtlCol="0">
+            <a:spAutoFit/>
+          </a:bodyPr>
+          <a:lstStyle/>
+          <a:p>
+            <a:r>
+              <a:rPr lang="en-US" dirty="0"/>
+              <a:t>r(e23) = </a:t>
+            </a:r>
+            <a:r>
+              <a:rPr lang="en-US" dirty="0" smtClean="0"/>
+              <a:t>2</a:t>
+            </a:r>
+          </a:p>
+          <a:p>
+            <a:pPr marL="0" lvl="1"/>
+            <a:r>
+              <a:rPr lang="en-US" b="1" dirty="0"/>
+              <a:t>r(e32) = 1</a:t>
+            </a:r>
+          </a:p>
+        </p:txBody>
+      </p:sp>
+      <p:sp>
+        <p:nvSpPr>
+          <p:cNvPr id="34" name="Pfeil nach unten 33"/>
+          <p:cNvSpPr/>
+          <p:nvPr/>
+        </p:nvSpPr>
+        <p:spPr>
+          <a:xfrm>
+            <a:off x="8535261" y="3299070"/>
+            <a:ext cx="574112" cy="639846"/>
+          </a:xfrm>
+          <a:prstGeom prst="downArrow">
+            <a:avLst/>
+          </a:prstGeom>
+          <a:solidFill>
+            <a:srgbClr val="0070C0"/>
+          </a:solidFill>
+        </p:spPr>
+        <p:style>
+          <a:lnRef idx="2">
+            <a:schemeClr val="accent1">
+              <a:shade val="50000"/>
+            </a:schemeClr>
+          </a:lnRef>
+          <a:fillRef idx="1">
+            <a:schemeClr val="accent1"/>
+          </a:fillRef>
+          <a:effectRef idx="0">
+            <a:schemeClr val="accent1"/>
+          </a:effectRef>
+          <a:fontRef idx="minor">
+            <a:schemeClr val="lt1"/>
+          </a:fontRef>
+        </p:style>
+        <p:txBody>
+          <a:bodyPr rtlCol="0" anchor="ctr"/>
+          <a:lstStyle/>
+          <a:p>
+            <a:pPr algn="ctr"/>
+            <a:endParaRPr lang="en-US"/>
+          </a:p>
+        </p:txBody>
+      </p:sp>
+    </p:spTree>
+    <p:extLst>
+      <p:ext uri="{BB962C8B-B14F-4D97-AF65-F5344CB8AC3E}">
+        <p14:creationId xmlns:p14="http://schemas.microsoft.com/office/powerpoint/2010/main" val="1641011994"/>
+      </p:ext>
+    </p:extLst>
+  </p:cSld>
+  <p:clrMapOvr>
+    <a:masterClrMapping/>
+  </p:clrMapOvr>
+  <p:timing>
+    <p:tnLst>
+      <p:par>
+        <p:cTn id="1" dur="indefinite" restart="never" nodeType="tmRoot"/>
+      </p:par>
+    </p:tnLst>
+  </p:timing>
+</p:sld>
+</file>
+
+<file path=ppt/slides/slide13.xml><?xml version="1.0" encoding="utf-8"?>
+<p:sld xmlns:a="http://schemas.openxmlformats.org/drawingml/2006/main" xmlns:r="http://schemas.openxmlformats.org/officeDocument/2006/relationships" xmlns:p="http://schemas.openxmlformats.org/presentationml/2006/main">
+  <p:cSld>
+    <p:spTree>
+      <p:nvGrpSpPr>
+        <p:cNvPr id="1" name=""/>
+        <p:cNvGrpSpPr/>
+        <p:nvPr/>
+      </p:nvGrpSpPr>
+      <p:grpSpPr>
+        <a:xfrm>
+          <a:off x="0" y="0"/>
+          <a:ext cx="0" cy="0"/>
+          <a:chOff x="0" y="0"/>
+          <a:chExt cx="0" cy="0"/>
+        </a:xfrm>
+      </p:grpSpPr>
+      <p:sp>
+        <p:nvSpPr>
+          <p:cNvPr id="2" name="Titel 1"/>
+          <p:cNvSpPr>
+            <a:spLocks noGrp="1"/>
+          </p:cNvSpPr>
+          <p:nvPr>
+            <p:ph type="title"/>
+          </p:nvPr>
+        </p:nvSpPr>
+        <p:spPr/>
+        <p:txBody>
+          <a:bodyPr/>
+          <a:lstStyle/>
+          <a:p>
+            <a:r>
+              <a:rPr lang="en-US" dirty="0" err="1"/>
+              <a:t>Testgraph</a:t>
+            </a:r>
+            <a:r>
+              <a:rPr lang="en-US" dirty="0"/>
+              <a:t> </a:t>
+            </a:r>
+            <a:r>
+              <a:rPr lang="en-US" dirty="0" smtClean="0"/>
+              <a:t>E2</a:t>
+            </a:r>
+            <a:endParaRPr lang="en-US" dirty="0"/>
+          </a:p>
+        </p:txBody>
+      </p:sp>
+      <p:sp>
+        <p:nvSpPr>
+          <p:cNvPr id="3" name="Inhaltsplatzhalter 2"/>
+          <p:cNvSpPr>
+            <a:spLocks noGrp="1"/>
+          </p:cNvSpPr>
+          <p:nvPr>
+            <p:ph idx="1"/>
+          </p:nvPr>
+        </p:nvSpPr>
+        <p:spPr/>
+        <p:txBody>
+          <a:bodyPr/>
+          <a:lstStyle/>
+          <a:p>
+            <a:r>
+              <a:rPr lang="en-US" smtClean="0"/>
+              <a:t>k=1.1</a:t>
+            </a:r>
+          </a:p>
+          <a:p>
+            <a:r>
+              <a:rPr lang="en-US" dirty="0" smtClean="0"/>
+              <a:t>This test case illustrates a situation where two links in a triangle have the same estimated remaining lifetime (e12 and e13)</a:t>
+            </a:r>
+            <a:endParaRPr lang="en-US" dirty="0"/>
+          </a:p>
+        </p:txBody>
+      </p:sp>
+      <p:sp>
+        <p:nvSpPr>
+          <p:cNvPr id="4" name="Ellipse 3"/>
+          <p:cNvSpPr/>
+          <p:nvPr/>
+        </p:nvSpPr>
+        <p:spPr>
+          <a:xfrm>
+            <a:off x="7301925" y="2144069"/>
+            <a:ext cx="328474" cy="328474"/>
+          </a:xfrm>
+          <a:prstGeom prst="ellipse">
+            <a:avLst/>
+          </a:prstGeom>
+          <a:solidFill>
+            <a:schemeClr val="tx1"/>
+          </a:solidFill>
+        </p:spPr>
+        <p:style>
+          <a:lnRef idx="2">
+            <a:schemeClr val="accent1">
+              <a:shade val="50000"/>
+            </a:schemeClr>
+          </a:lnRef>
+          <a:fillRef idx="1">
+            <a:schemeClr val="accent1"/>
+          </a:fillRef>
+          <a:effectRef idx="0">
+            <a:schemeClr val="accent1"/>
+          </a:effectRef>
+          <a:fontRef idx="minor">
+            <a:schemeClr val="lt1"/>
+          </a:fontRef>
+        </p:style>
+        <p:txBody>
+          <a:bodyPr rtlCol="0" anchor="ctr"/>
+          <a:lstStyle/>
+          <a:p>
+            <a:pPr algn="ctr"/>
+            <a:r>
+              <a:rPr lang="en-US" dirty="0" smtClean="0"/>
+              <a:t>1</a:t>
+            </a:r>
+            <a:endParaRPr lang="en-US" dirty="0"/>
+          </a:p>
+        </p:txBody>
+      </p:sp>
+      <p:sp>
+        <p:nvSpPr>
+          <p:cNvPr id="5" name="Ellipse 4"/>
+          <p:cNvSpPr/>
+          <p:nvPr/>
+        </p:nvSpPr>
+        <p:spPr>
+          <a:xfrm>
+            <a:off x="8231819" y="845564"/>
+            <a:ext cx="328474" cy="328474"/>
+          </a:xfrm>
+          <a:prstGeom prst="ellipse">
+            <a:avLst/>
+          </a:prstGeom>
+          <a:solidFill>
+            <a:schemeClr val="tx1"/>
+          </a:solidFill>
+        </p:spPr>
+        <p:style>
+          <a:lnRef idx="2">
+            <a:schemeClr val="accent1">
+              <a:shade val="50000"/>
+            </a:schemeClr>
+          </a:lnRef>
+          <a:fillRef idx="1">
+            <a:schemeClr val="accent1"/>
+          </a:fillRef>
+          <a:effectRef idx="0">
+            <a:schemeClr val="accent1"/>
+          </a:effectRef>
+          <a:fontRef idx="minor">
+            <a:schemeClr val="lt1"/>
+          </a:fontRef>
+        </p:style>
+        <p:txBody>
+          <a:bodyPr rtlCol="0" anchor="ctr"/>
+          <a:lstStyle/>
+          <a:p>
+            <a:pPr algn="ctr"/>
+            <a:r>
+              <a:rPr lang="en-US" dirty="0"/>
+              <a:t>2</a:t>
+            </a:r>
+          </a:p>
+        </p:txBody>
+      </p:sp>
+      <p:sp>
+        <p:nvSpPr>
+          <p:cNvPr id="6" name="Ellipse 5"/>
+          <p:cNvSpPr/>
+          <p:nvPr/>
+        </p:nvSpPr>
+        <p:spPr>
+          <a:xfrm>
+            <a:off x="10150136" y="2192173"/>
+            <a:ext cx="328474" cy="328474"/>
+          </a:xfrm>
+          <a:prstGeom prst="ellipse">
+            <a:avLst/>
+          </a:prstGeom>
+          <a:solidFill>
+            <a:schemeClr val="tx1"/>
+          </a:solidFill>
+        </p:spPr>
+        <p:style>
+          <a:lnRef idx="2">
+            <a:schemeClr val="accent1">
+              <a:shade val="50000"/>
+            </a:schemeClr>
+          </a:lnRef>
+          <a:fillRef idx="1">
+            <a:schemeClr val="accent1"/>
+          </a:fillRef>
+          <a:effectRef idx="0">
+            <a:schemeClr val="accent1"/>
+          </a:effectRef>
+          <a:fontRef idx="minor">
+            <a:schemeClr val="lt1"/>
+          </a:fontRef>
+        </p:style>
+        <p:txBody>
+          <a:bodyPr rtlCol="0" anchor="ctr"/>
+          <a:lstStyle/>
+          <a:p>
+            <a:pPr algn="ctr"/>
+            <a:r>
+              <a:rPr lang="en-US" dirty="0" smtClean="0"/>
+              <a:t>3</a:t>
+            </a:r>
+            <a:endParaRPr lang="en-US" dirty="0"/>
+          </a:p>
+        </p:txBody>
+      </p:sp>
+      <p:cxnSp>
+        <p:nvCxnSpPr>
+          <p:cNvPr id="7" name="Gerader Verbinder 6"/>
+          <p:cNvCxnSpPr>
+            <a:stCxn id="4" idx="7"/>
+            <a:endCxn id="5" idx="3"/>
+          </p:cNvCxnSpPr>
+          <p:nvPr/>
+        </p:nvCxnSpPr>
+        <p:spPr>
+          <a:xfrm flipV="1">
+            <a:off x="7582295" y="1125934"/>
+            <a:ext cx="697628" cy="1066239"/>
+          </a:xfrm>
+          <a:prstGeom prst="line">
+            <a:avLst/>
+          </a:prstGeom>
+          <a:ln w="38100">
+            <a:solidFill>
+              <a:schemeClr val="tx1"/>
+            </a:solidFill>
+          </a:ln>
+        </p:spPr>
+        <p:style>
+          <a:lnRef idx="1">
+            <a:schemeClr val="accent1"/>
+          </a:lnRef>
+          <a:fillRef idx="0">
+            <a:schemeClr val="accent1"/>
+          </a:fillRef>
+          <a:effectRef idx="0">
+            <a:schemeClr val="accent1"/>
+          </a:effectRef>
+          <a:fontRef idx="minor">
+            <a:schemeClr val="tx1"/>
+          </a:fontRef>
+        </p:style>
+      </p:cxnSp>
+      <p:cxnSp>
+        <p:nvCxnSpPr>
+          <p:cNvPr id="8" name="Gerader Verbinder 7"/>
+          <p:cNvCxnSpPr>
+            <a:stCxn id="6" idx="1"/>
+            <a:endCxn id="5" idx="5"/>
+          </p:cNvCxnSpPr>
+          <p:nvPr/>
+        </p:nvCxnSpPr>
+        <p:spPr>
+          <a:xfrm flipH="1" flipV="1">
+            <a:off x="8512189" y="1125934"/>
+            <a:ext cx="1686051" cy="1114343"/>
+          </a:xfrm>
+          <a:prstGeom prst="line">
+            <a:avLst/>
+          </a:prstGeom>
+          <a:ln w="38100">
+            <a:solidFill>
+              <a:schemeClr val="tx1"/>
+            </a:solidFill>
+          </a:ln>
+        </p:spPr>
+        <p:style>
+          <a:lnRef idx="1">
+            <a:schemeClr val="accent1"/>
+          </a:lnRef>
+          <a:fillRef idx="0">
+            <a:schemeClr val="accent1"/>
+          </a:fillRef>
+          <a:effectRef idx="0">
+            <a:schemeClr val="accent1"/>
+          </a:effectRef>
+          <a:fontRef idx="minor">
+            <a:schemeClr val="tx1"/>
+          </a:fontRef>
+        </p:style>
+      </p:cxnSp>
+      <p:cxnSp>
+        <p:nvCxnSpPr>
+          <p:cNvPr id="9" name="Gerader Verbinder 8"/>
+          <p:cNvCxnSpPr>
+            <a:stCxn id="6" idx="2"/>
+            <a:endCxn id="4" idx="6"/>
+          </p:cNvCxnSpPr>
+          <p:nvPr/>
+        </p:nvCxnSpPr>
+        <p:spPr>
+          <a:xfrm flipH="1" flipV="1">
+            <a:off x="7630399" y="2308306"/>
+            <a:ext cx="2519737" cy="48104"/>
+          </a:xfrm>
+          <a:prstGeom prst="line">
+            <a:avLst/>
+          </a:prstGeom>
+          <a:ln w="38100">
+            <a:solidFill>
+              <a:schemeClr val="tx1"/>
+            </a:solidFill>
+          </a:ln>
+        </p:spPr>
+        <p:style>
+          <a:lnRef idx="1">
+            <a:schemeClr val="accent1"/>
+          </a:lnRef>
+          <a:fillRef idx="0">
+            <a:schemeClr val="accent1"/>
+          </a:fillRef>
+          <a:effectRef idx="0">
+            <a:schemeClr val="accent1"/>
+          </a:effectRef>
+          <a:fontRef idx="minor">
+            <a:schemeClr val="tx1"/>
+          </a:fontRef>
+        </p:style>
+      </p:cxnSp>
+      <p:sp>
+        <p:nvSpPr>
+          <p:cNvPr id="10" name="Textfeld 9"/>
+          <p:cNvSpPr txBox="1"/>
+          <p:nvPr/>
+        </p:nvSpPr>
+        <p:spPr>
+          <a:xfrm>
             <a:off x="7543860" y="1390910"/>
             <a:ext cx="418704" cy="369332"/>
           </a:xfrm>
@@ -6612,7 +7427,6 @@
               <a:rPr lang="en-US" dirty="0" smtClean="0"/>
               <a:t>1</a:t>
             </a:r>
-            <a:endParaRPr lang="en-US" dirty="0" smtClean="0"/>
           </a:p>
           <a:p>
             <a:pPr marL="0" lvl="1"/>

</xml_diff>